<commit_message>
Updates for newer data.
</commit_message>
<xml_diff>
--- a/Python program structure.pptx
+++ b/Python program structure.pptx
@@ -305,7 +305,7 @@
           <a:p>
             <a:fld id="{DCC446B6-7B9C-A04B-98D9-80CC642E8FE6}" type="datetimeFigureOut">
               <a:rPr lang="en-US" smtClean="0"/>
-              <a:t>3/14/18</a:t>
+              <a:t>3/29/18</a:t>
             </a:fld>
             <a:endParaRPr lang="en-US"/>
           </a:p>
@@ -475,7 +475,7 @@
           <a:p>
             <a:fld id="{DCC446B6-7B9C-A04B-98D9-80CC642E8FE6}" type="datetimeFigureOut">
               <a:rPr lang="en-US" smtClean="0"/>
-              <a:t>3/14/18</a:t>
+              <a:t>3/29/18</a:t>
             </a:fld>
             <a:endParaRPr lang="en-US"/>
           </a:p>
@@ -655,7 +655,7 @@
           <a:p>
             <a:fld id="{DCC446B6-7B9C-A04B-98D9-80CC642E8FE6}" type="datetimeFigureOut">
               <a:rPr lang="en-US" smtClean="0"/>
-              <a:t>3/14/18</a:t>
+              <a:t>3/29/18</a:t>
             </a:fld>
             <a:endParaRPr lang="en-US"/>
           </a:p>
@@ -825,7 +825,7 @@
           <a:p>
             <a:fld id="{DCC446B6-7B9C-A04B-98D9-80CC642E8FE6}" type="datetimeFigureOut">
               <a:rPr lang="en-US" smtClean="0"/>
-              <a:t>3/14/18</a:t>
+              <a:t>3/29/18</a:t>
             </a:fld>
             <a:endParaRPr lang="en-US"/>
           </a:p>
@@ -1071,7 +1071,7 @@
           <a:p>
             <a:fld id="{DCC446B6-7B9C-A04B-98D9-80CC642E8FE6}" type="datetimeFigureOut">
               <a:rPr lang="en-US" smtClean="0"/>
-              <a:t>3/14/18</a:t>
+              <a:t>3/29/18</a:t>
             </a:fld>
             <a:endParaRPr lang="en-US"/>
           </a:p>
@@ -1359,7 +1359,7 @@
           <a:p>
             <a:fld id="{DCC446B6-7B9C-A04B-98D9-80CC642E8FE6}" type="datetimeFigureOut">
               <a:rPr lang="en-US" smtClean="0"/>
-              <a:t>3/14/18</a:t>
+              <a:t>3/29/18</a:t>
             </a:fld>
             <a:endParaRPr lang="en-US"/>
           </a:p>
@@ -1781,7 +1781,7 @@
           <a:p>
             <a:fld id="{DCC446B6-7B9C-A04B-98D9-80CC642E8FE6}" type="datetimeFigureOut">
               <a:rPr lang="en-US" smtClean="0"/>
-              <a:t>3/14/18</a:t>
+              <a:t>3/29/18</a:t>
             </a:fld>
             <a:endParaRPr lang="en-US"/>
           </a:p>
@@ -1899,7 +1899,7 @@
           <a:p>
             <a:fld id="{DCC446B6-7B9C-A04B-98D9-80CC642E8FE6}" type="datetimeFigureOut">
               <a:rPr lang="en-US" smtClean="0"/>
-              <a:t>3/14/18</a:t>
+              <a:t>3/29/18</a:t>
             </a:fld>
             <a:endParaRPr lang="en-US"/>
           </a:p>
@@ -1994,7 +1994,7 @@
           <a:p>
             <a:fld id="{DCC446B6-7B9C-A04B-98D9-80CC642E8FE6}" type="datetimeFigureOut">
               <a:rPr lang="en-US" smtClean="0"/>
-              <a:t>3/14/18</a:t>
+              <a:t>3/29/18</a:t>
             </a:fld>
             <a:endParaRPr lang="en-US"/>
           </a:p>
@@ -2271,7 +2271,7 @@
           <a:p>
             <a:fld id="{DCC446B6-7B9C-A04B-98D9-80CC642E8FE6}" type="datetimeFigureOut">
               <a:rPr lang="en-US" smtClean="0"/>
-              <a:t>3/14/18</a:t>
+              <a:t>3/29/18</a:t>
             </a:fld>
             <a:endParaRPr lang="en-US"/>
           </a:p>
@@ -2524,7 +2524,7 @@
           <a:p>
             <a:fld id="{DCC446B6-7B9C-A04B-98D9-80CC642E8FE6}" type="datetimeFigureOut">
               <a:rPr lang="en-US" smtClean="0"/>
-              <a:t>3/14/18</a:t>
+              <a:t>3/29/18</a:t>
             </a:fld>
             <a:endParaRPr lang="en-US"/>
           </a:p>
@@ -2737,7 +2737,7 @@
           <a:p>
             <a:fld id="{DCC446B6-7B9C-A04B-98D9-80CC642E8FE6}" type="datetimeFigureOut">
               <a:rPr lang="en-US" smtClean="0"/>
-              <a:t>3/14/18</a:t>
+              <a:t>3/29/18</a:t>
             </a:fld>
             <a:endParaRPr lang="en-US"/>
           </a:p>
@@ -11816,7 +11816,7 @@
         </p:nvSpPr>
         <p:spPr>
           <a:xfrm>
-            <a:off x="5278799" y="2138876"/>
+            <a:off x="5278799" y="1283418"/>
             <a:ext cx="2051537" cy="369332"/>
           </a:xfrm>
           <a:prstGeom prst="rect">
@@ -11851,7 +11851,7 @@
         </p:nvSpPr>
         <p:spPr>
           <a:xfrm>
-            <a:off x="1836526" y="1124758"/>
+            <a:off x="1836527" y="655890"/>
             <a:ext cx="3253221" cy="468868"/>
           </a:xfrm>
           <a:prstGeom prst="ellipse">
@@ -11896,8 +11896,8 @@
         </p:nvCxnSpPr>
         <p:spPr>
           <a:xfrm rot="16200000" flipH="1">
-            <a:off x="4611227" y="445535"/>
-            <a:ext cx="545250" cy="2841431"/>
+            <a:off x="4804523" y="-216627"/>
+            <a:ext cx="158660" cy="2841430"/>
           </a:xfrm>
           <a:prstGeom prst="bentConnector3">
             <a:avLst>
@@ -11931,8 +11931,8 @@
         </p:nvCxnSpPr>
         <p:spPr>
           <a:xfrm rot="16200000" flipV="1">
-            <a:off x="2870770" y="532391"/>
-            <a:ext cx="755426" cy="429308"/>
+            <a:off x="3105205" y="297956"/>
+            <a:ext cx="286558" cy="429309"/>
           </a:xfrm>
           <a:prstGeom prst="bentConnector3">
             <a:avLst>
@@ -11963,7 +11963,7 @@
         </p:nvSpPr>
         <p:spPr>
           <a:xfrm>
-            <a:off x="2455408" y="4909953"/>
+            <a:off x="2684724" y="5737635"/>
             <a:ext cx="2988485" cy="369332"/>
           </a:xfrm>
           <a:prstGeom prst="rect">
@@ -11980,11 +11980,7 @@
             <a:pPr algn="ctr"/>
             <a:r>
               <a:rPr lang="en-US" dirty="0" err="1" smtClean="0"/>
-              <a:t>Xiaohong_pASCAT</a:t>
-            </a:r>
-            <a:r>
-              <a:rPr lang="en-US" dirty="0" err="1" smtClean="0"/>
-              <a:t>_compare</a:t>
+              <a:t>Xiaohong_pASCAT_compare</a:t>
             </a:r>
             <a:r>
               <a:rPr lang="en-US" dirty="0" smtClean="0"/>
@@ -12005,7 +12001,7 @@
         </p:nvCxnSpPr>
         <p:spPr>
           <a:xfrm rot="5400000">
-            <a:off x="3773420" y="4727371"/>
+            <a:off x="4002736" y="5555053"/>
             <a:ext cx="358814" cy="6351"/>
           </a:xfrm>
           <a:prstGeom prst="bentConnector3">
@@ -12040,8 +12036,8 @@
         </p:nvCxnSpPr>
         <p:spPr>
           <a:xfrm rot="5400000">
-            <a:off x="2037337" y="722872"/>
-            <a:ext cx="555047" cy="2296555"/>
+            <a:off x="2230632" y="60708"/>
+            <a:ext cx="168457" cy="2296556"/>
           </a:xfrm>
           <a:prstGeom prst="bentConnector3">
             <a:avLst>
@@ -12075,7 +12071,7 @@
         </p:nvCxnSpPr>
         <p:spPr>
           <a:xfrm>
-            <a:off x="5443893" y="5094619"/>
+            <a:off x="5673209" y="5922301"/>
             <a:ext cx="424921" cy="253330"/>
           </a:xfrm>
           <a:prstGeom prst="bentConnector2">
@@ -12140,7 +12136,7 @@
         </p:nvSpPr>
         <p:spPr>
           <a:xfrm>
-            <a:off x="-40671" y="2148673"/>
+            <a:off x="-40671" y="1293215"/>
             <a:ext cx="2414505" cy="369332"/>
           </a:xfrm>
           <a:prstGeom prst="rect">
@@ -12178,8 +12174,8 @@
         </p:nvCxnSpPr>
         <p:spPr>
           <a:xfrm rot="16200000" flipV="1">
-            <a:off x="2501116" y="1183471"/>
-            <a:ext cx="119380" cy="2788448"/>
+            <a:off x="1712786" y="1116343"/>
+            <a:ext cx="331040" cy="1423448"/>
           </a:xfrm>
           <a:prstGeom prst="bentConnector3">
             <a:avLst>
@@ -12210,7 +12206,7 @@
         </p:nvSpPr>
         <p:spPr>
           <a:xfrm>
-            <a:off x="5359351" y="5279285"/>
+            <a:off x="5588667" y="6106967"/>
             <a:ext cx="3478829" cy="468868"/>
           </a:xfrm>
           <a:prstGeom prst="ellipse">
@@ -12252,7 +12248,7 @@
         </p:nvSpPr>
         <p:spPr>
           <a:xfrm>
-            <a:off x="2550708" y="2637385"/>
+            <a:off x="1185708" y="1993587"/>
             <a:ext cx="2808643" cy="468868"/>
           </a:xfrm>
           <a:prstGeom prst="ellipse">
@@ -12294,7 +12290,7 @@
         </p:nvSpPr>
         <p:spPr>
           <a:xfrm>
-            <a:off x="2024224" y="4082271"/>
+            <a:off x="2253540" y="4909953"/>
             <a:ext cx="3863555" cy="468868"/>
           </a:xfrm>
           <a:prstGeom prst="ellipse">
@@ -12338,9 +12334,9 @@
           <p:nvPr/>
         </p:nvCxnSpPr>
         <p:spPr>
-          <a:xfrm rot="5400000" flipH="1" flipV="1">
-            <a:off x="3853382" y="3202523"/>
-            <a:ext cx="197917" cy="5379"/>
+          <a:xfrm rot="16200000" flipV="1">
+            <a:off x="3104740" y="1947746"/>
+            <a:ext cx="330203" cy="1359621"/>
           </a:xfrm>
           <a:prstGeom prst="bentConnector3">
             <a:avLst>
@@ -12371,7 +12367,7 @@
         </p:nvSpPr>
         <p:spPr>
           <a:xfrm>
-            <a:off x="2539951" y="3304170"/>
+            <a:off x="2539951" y="2792658"/>
             <a:ext cx="2819400" cy="369332"/>
           </a:xfrm>
           <a:prstGeom prst="rect">
@@ -12403,14 +12399,46 @@
           <p:cNvPr id="63" name="Elbow Connector 62"/>
           <p:cNvCxnSpPr>
             <a:stCxn id="51" idx="1"/>
-            <a:endCxn id="12" idx="2"/>
           </p:cNvCxnSpPr>
           <p:nvPr/>
         </p:nvCxnSpPr>
         <p:spPr>
           <a:xfrm rot="16200000" flipV="1">
-            <a:off x="1061841" y="2622746"/>
-            <a:ext cx="1632930" cy="1423447"/>
+            <a:off x="1728642" y="3887913"/>
+            <a:ext cx="235228" cy="1946179"/>
+          </a:xfrm>
+          <a:prstGeom prst="bentConnector2">
+            <a:avLst/>
+          </a:prstGeom>
+        </p:spPr>
+        <p:style>
+          <a:lnRef idx="2">
+            <a:schemeClr val="accent1"/>
+          </a:lnRef>
+          <a:fillRef idx="0">
+            <a:schemeClr val="accent1"/>
+          </a:fillRef>
+          <a:effectRef idx="1">
+            <a:schemeClr val="accent1"/>
+          </a:effectRef>
+          <a:fontRef idx="minor">
+            <a:schemeClr val="tx1"/>
+          </a:fontRef>
+        </p:style>
+      </p:cxnSp>
+      <p:cxnSp>
+        <p:nvCxnSpPr>
+          <p:cNvPr id="66" name="Elbow Connector 65"/>
+          <p:cNvCxnSpPr>
+            <a:stCxn id="51" idx="7"/>
+            <a:endCxn id="2" idx="2"/>
+          </p:cNvCxnSpPr>
+          <p:nvPr/>
+        </p:nvCxnSpPr>
+        <p:spPr>
+          <a:xfrm rot="5400000" flipH="1" flipV="1">
+            <a:off x="4264996" y="2939045"/>
+            <a:ext cx="3325867" cy="753278"/>
           </a:xfrm>
           <a:prstGeom prst="bentConnector3">
             <a:avLst>
@@ -12435,17 +12463,17 @@
       </p:cxnSp>
       <p:cxnSp>
         <p:nvCxnSpPr>
-          <p:cNvPr id="66" name="Elbow Connector 65"/>
-          <p:cNvCxnSpPr>
-            <a:stCxn id="51" idx="7"/>
-            <a:endCxn id="2" idx="2"/>
-          </p:cNvCxnSpPr>
-          <p:nvPr/>
-        </p:nvCxnSpPr>
-        <p:spPr>
-          <a:xfrm rot="5400000" flipH="1" flipV="1">
-            <a:off x="4991908" y="2838275"/>
-            <a:ext cx="1642727" cy="982594"/>
+          <p:cNvPr id="69" name="Elbow Connector 68"/>
+          <p:cNvCxnSpPr>
+            <a:stCxn id="51" idx="0"/>
+            <a:endCxn id="53" idx="2"/>
+          </p:cNvCxnSpPr>
+          <p:nvPr/>
+        </p:nvCxnSpPr>
+        <p:spPr>
+          <a:xfrm rot="16200000" flipV="1">
+            <a:off x="3193504" y="3918138"/>
+            <a:ext cx="1747963" cy="235667"/>
           </a:xfrm>
           <a:prstGeom prst="bentConnector3">
             <a:avLst>
@@ -12470,41 +12498,6 @@
       </p:cxnSp>
       <p:cxnSp>
         <p:nvCxnSpPr>
-          <p:cNvPr id="69" name="Elbow Connector 68"/>
-          <p:cNvCxnSpPr>
-            <a:stCxn id="51" idx="0"/>
-            <a:endCxn id="53" idx="2"/>
-          </p:cNvCxnSpPr>
-          <p:nvPr/>
-        </p:nvCxnSpPr>
-        <p:spPr>
-          <a:xfrm rot="16200000" flipV="1">
-            <a:off x="3748443" y="3874711"/>
-            <a:ext cx="408769" cy="6351"/>
-          </a:xfrm>
-          <a:prstGeom prst="bentConnector3">
-            <a:avLst>
-              <a:gd name="adj1" fmla="val 50000"/>
-            </a:avLst>
-          </a:prstGeom>
-        </p:spPr>
-        <p:style>
-          <a:lnRef idx="2">
-            <a:schemeClr val="accent1"/>
-          </a:lnRef>
-          <a:fillRef idx="0">
-            <a:schemeClr val="accent1"/>
-          </a:fillRef>
-          <a:effectRef idx="1">
-            <a:schemeClr val="accent1"/>
-          </a:effectRef>
-          <a:fontRef idx="minor">
-            <a:schemeClr val="tx1"/>
-          </a:fontRef>
-        </p:style>
-      </p:cxnSp>
-      <p:cxnSp>
-        <p:nvCxnSpPr>
           <p:cNvPr id="99" name="Elbow Connector 98"/>
           <p:cNvCxnSpPr>
             <a:stCxn id="15" idx="3"/>
@@ -12514,7 +12507,7 @@
         </p:nvCxnSpPr>
         <p:spPr>
           <a:xfrm rot="5400000" flipH="1">
-            <a:off x="4709131" y="4519806"/>
+            <a:off x="4938447" y="5347488"/>
             <a:ext cx="400204" cy="1919163"/>
           </a:xfrm>
           <a:prstGeom prst="bentConnector3">

</xml_diff>

<commit_message>
Many many updates. Haven't been able to use svn on work machine in some time; this collects all the changes since then.
</commit_message>
<xml_diff>
--- a/Python program structure.pptx
+++ b/Python program structure.pptx
@@ -306,7 +306,7 @@
           <a:p>
             <a:fld id="{DCC446B6-7B9C-A04B-98D9-80CC642E8FE6}" type="datetimeFigureOut">
               <a:rPr lang="en-US" smtClean="0"/>
-              <a:t>5/10/18</a:t>
+              <a:t>5/18/18</a:t>
             </a:fld>
             <a:endParaRPr lang="en-US"/>
           </a:p>
@@ -476,7 +476,7 @@
           <a:p>
             <a:fld id="{DCC446B6-7B9C-A04B-98D9-80CC642E8FE6}" type="datetimeFigureOut">
               <a:rPr lang="en-US" smtClean="0"/>
-              <a:t>5/10/18</a:t>
+              <a:t>5/18/18</a:t>
             </a:fld>
             <a:endParaRPr lang="en-US"/>
           </a:p>
@@ -656,7 +656,7 @@
           <a:p>
             <a:fld id="{DCC446B6-7B9C-A04B-98D9-80CC642E8FE6}" type="datetimeFigureOut">
               <a:rPr lang="en-US" smtClean="0"/>
-              <a:t>5/10/18</a:t>
+              <a:t>5/18/18</a:t>
             </a:fld>
             <a:endParaRPr lang="en-US"/>
           </a:p>
@@ -826,7 +826,7 @@
           <a:p>
             <a:fld id="{DCC446B6-7B9C-A04B-98D9-80CC642E8FE6}" type="datetimeFigureOut">
               <a:rPr lang="en-US" smtClean="0"/>
-              <a:t>5/10/18</a:t>
+              <a:t>5/18/18</a:t>
             </a:fld>
             <a:endParaRPr lang="en-US"/>
           </a:p>
@@ -1072,7 +1072,7 @@
           <a:p>
             <a:fld id="{DCC446B6-7B9C-A04B-98D9-80CC642E8FE6}" type="datetimeFigureOut">
               <a:rPr lang="en-US" smtClean="0"/>
-              <a:t>5/10/18</a:t>
+              <a:t>5/18/18</a:t>
             </a:fld>
             <a:endParaRPr lang="en-US"/>
           </a:p>
@@ -1360,7 +1360,7 @@
           <a:p>
             <a:fld id="{DCC446B6-7B9C-A04B-98D9-80CC642E8FE6}" type="datetimeFigureOut">
               <a:rPr lang="en-US" smtClean="0"/>
-              <a:t>5/10/18</a:t>
+              <a:t>5/18/18</a:t>
             </a:fld>
             <a:endParaRPr lang="en-US"/>
           </a:p>
@@ -1782,7 +1782,7 @@
           <a:p>
             <a:fld id="{DCC446B6-7B9C-A04B-98D9-80CC642E8FE6}" type="datetimeFigureOut">
               <a:rPr lang="en-US" smtClean="0"/>
-              <a:t>5/10/18</a:t>
+              <a:t>5/18/18</a:t>
             </a:fld>
             <a:endParaRPr lang="en-US"/>
           </a:p>
@@ -1900,7 +1900,7 @@
           <a:p>
             <a:fld id="{DCC446B6-7B9C-A04B-98D9-80CC642E8FE6}" type="datetimeFigureOut">
               <a:rPr lang="en-US" smtClean="0"/>
-              <a:t>5/10/18</a:t>
+              <a:t>5/18/18</a:t>
             </a:fld>
             <a:endParaRPr lang="en-US"/>
           </a:p>
@@ -1995,7 +1995,7 @@
           <a:p>
             <a:fld id="{DCC446B6-7B9C-A04B-98D9-80CC642E8FE6}" type="datetimeFigureOut">
               <a:rPr lang="en-US" smtClean="0"/>
-              <a:t>5/10/18</a:t>
+              <a:t>5/18/18</a:t>
             </a:fld>
             <a:endParaRPr lang="en-US"/>
           </a:p>
@@ -2272,7 +2272,7 @@
           <a:p>
             <a:fld id="{DCC446B6-7B9C-A04B-98D9-80CC642E8FE6}" type="datetimeFigureOut">
               <a:rPr lang="en-US" smtClean="0"/>
-              <a:t>5/10/18</a:t>
+              <a:t>5/18/18</a:t>
             </a:fld>
             <a:endParaRPr lang="en-US"/>
           </a:p>
@@ -2525,7 +2525,7 @@
           <a:p>
             <a:fld id="{DCC446B6-7B9C-A04B-98D9-80CC642E8FE6}" type="datetimeFigureOut">
               <a:rPr lang="en-US" smtClean="0"/>
-              <a:t>5/10/18</a:t>
+              <a:t>5/18/18</a:t>
             </a:fld>
             <a:endParaRPr lang="en-US"/>
           </a:p>
@@ -2738,7 +2738,7 @@
           <a:p>
             <a:fld id="{DCC446B6-7B9C-A04B-98D9-80CC642E8FE6}" type="datetimeFigureOut">
               <a:rPr lang="en-US" smtClean="0"/>
-              <a:t>5/10/18</a:t>
+              <a:t>5/18/18</a:t>
             </a:fld>
             <a:endParaRPr lang="en-US"/>
           </a:p>
@@ -4823,8 +4823,8 @@
         </p:nvSpPr>
         <p:spPr>
           <a:xfrm>
-            <a:off x="711199" y="2865399"/>
-            <a:ext cx="1871135" cy="468868"/>
+            <a:off x="278345" y="2865399"/>
+            <a:ext cx="2303990" cy="468868"/>
           </a:xfrm>
           <a:prstGeom prst="ellipse">
             <a:avLst/>
@@ -5011,8 +5011,8 @@
         </p:nvCxnSpPr>
         <p:spPr>
           <a:xfrm rot="5400000">
-            <a:off x="1185103" y="3440331"/>
-            <a:ext cx="567729" cy="355600"/>
+            <a:off x="1076890" y="3548545"/>
+            <a:ext cx="567729" cy="139173"/>
           </a:xfrm>
           <a:prstGeom prst="bentConnector3">
             <a:avLst>
@@ -5084,8 +5084,8 @@
         </p:nvCxnSpPr>
         <p:spPr>
           <a:xfrm rot="5400000" flipH="1" flipV="1">
-            <a:off x="2333840" y="1523642"/>
-            <a:ext cx="654684" cy="2028830"/>
+            <a:off x="2225626" y="1415429"/>
+            <a:ext cx="654684" cy="2245257"/>
           </a:xfrm>
           <a:prstGeom prst="bentConnector3">
             <a:avLst>
@@ -15503,8 +15503,8 @@
         </p:nvCxnSpPr>
         <p:spPr>
           <a:xfrm rot="16200000" flipH="1">
-            <a:off x="3211610" y="4167561"/>
-            <a:ext cx="158544" cy="251328"/>
+            <a:off x="3255937" y="4123234"/>
+            <a:ext cx="158544" cy="339982"/>
           </a:xfrm>
           <a:prstGeom prst="bentConnector3">
             <a:avLst>
@@ -15535,8 +15535,8 @@
         </p:nvSpPr>
         <p:spPr>
           <a:xfrm>
-            <a:off x="1993886" y="4372497"/>
-            <a:ext cx="2845319" cy="369332"/>
+            <a:off x="2819400" y="4372497"/>
+            <a:ext cx="1371599" cy="369332"/>
           </a:xfrm>
           <a:prstGeom prst="rect">
             <a:avLst/>
@@ -15556,11 +15556,7 @@
             </a:r>
             <a:r>
               <a:rPr lang="en-US" i="1" dirty="0" err="1" smtClean="0"/>
-              <a:t>tag_</a:t>
-            </a:r>
-            <a:r>
-              <a:rPr lang="en-US" dirty="0" err="1" smtClean="0"/>
-              <a:t>joined_best</a:t>
+              <a:t>tag</a:t>
             </a:r>
             <a:r>
               <a:rPr lang="en-US" dirty="0" smtClean="0"/>
@@ -15736,8 +15732,8 @@
         </p:nvCxnSpPr>
         <p:spPr>
           <a:xfrm rot="5400000">
-            <a:off x="2623897" y="4230534"/>
-            <a:ext cx="281354" cy="1303945"/>
+            <a:off x="2668224" y="4186207"/>
+            <a:ext cx="281354" cy="1392599"/>
           </a:xfrm>
           <a:prstGeom prst="bentConnector3">
             <a:avLst>
@@ -15884,14 +15880,15 @@
         <p:nvCxnSpPr>
           <p:cNvPr id="83" name="Elbow Connector 82"/>
           <p:cNvCxnSpPr>
+            <a:stCxn id="55" idx="3"/>
             <a:endCxn id="80" idx="0"/>
           </p:cNvCxnSpPr>
           <p:nvPr/>
         </p:nvCxnSpPr>
         <p:spPr>
           <a:xfrm>
-            <a:off x="4629605" y="4557163"/>
-            <a:ext cx="1828571" cy="278168"/>
+            <a:off x="4190999" y="4557163"/>
+            <a:ext cx="2267177" cy="278168"/>
           </a:xfrm>
           <a:prstGeom prst="bentConnector2">
             <a:avLst/>

</xml_diff>

<commit_message>
Mostly updates to calculate odds:  now that we have 'final calls', we can make actual estimates of P(E|ploidy) values.  Other updates include finally expunging the use of the 'best analysis' directory, and calculating accuracies from the other information in the summaries.  Also, we now use a gamma of 500 for everything except patient 772, who gets g550.
</commit_message>
<xml_diff>
--- a/Python program structure.pptx
+++ b/Python program structure.pptx
@@ -306,7 +306,7 @@
           <a:p>
             <a:fld id="{DCC446B6-7B9C-A04B-98D9-80CC642E8FE6}" type="datetimeFigureOut">
               <a:rPr lang="en-US" smtClean="0"/>
-              <a:t>5/18/18</a:t>
+              <a:t>7/19/18</a:t>
             </a:fld>
             <a:endParaRPr lang="en-US"/>
           </a:p>
@@ -476,7 +476,7 @@
           <a:p>
             <a:fld id="{DCC446B6-7B9C-A04B-98D9-80CC642E8FE6}" type="datetimeFigureOut">
               <a:rPr lang="en-US" smtClean="0"/>
-              <a:t>5/18/18</a:t>
+              <a:t>7/19/18</a:t>
             </a:fld>
             <a:endParaRPr lang="en-US"/>
           </a:p>
@@ -656,7 +656,7 @@
           <a:p>
             <a:fld id="{DCC446B6-7B9C-A04B-98D9-80CC642E8FE6}" type="datetimeFigureOut">
               <a:rPr lang="en-US" smtClean="0"/>
-              <a:t>5/18/18</a:t>
+              <a:t>7/19/18</a:t>
             </a:fld>
             <a:endParaRPr lang="en-US"/>
           </a:p>
@@ -826,7 +826,7 @@
           <a:p>
             <a:fld id="{DCC446B6-7B9C-A04B-98D9-80CC642E8FE6}" type="datetimeFigureOut">
               <a:rPr lang="en-US" smtClean="0"/>
-              <a:t>5/18/18</a:t>
+              <a:t>7/19/18</a:t>
             </a:fld>
             <a:endParaRPr lang="en-US"/>
           </a:p>
@@ -1072,7 +1072,7 @@
           <a:p>
             <a:fld id="{DCC446B6-7B9C-A04B-98D9-80CC642E8FE6}" type="datetimeFigureOut">
               <a:rPr lang="en-US" smtClean="0"/>
-              <a:t>5/18/18</a:t>
+              <a:t>7/19/18</a:t>
             </a:fld>
             <a:endParaRPr lang="en-US"/>
           </a:p>
@@ -1360,7 +1360,7 @@
           <a:p>
             <a:fld id="{DCC446B6-7B9C-A04B-98D9-80CC642E8FE6}" type="datetimeFigureOut">
               <a:rPr lang="en-US" smtClean="0"/>
-              <a:t>5/18/18</a:t>
+              <a:t>7/19/18</a:t>
             </a:fld>
             <a:endParaRPr lang="en-US"/>
           </a:p>
@@ -1782,7 +1782,7 @@
           <a:p>
             <a:fld id="{DCC446B6-7B9C-A04B-98D9-80CC642E8FE6}" type="datetimeFigureOut">
               <a:rPr lang="en-US" smtClean="0"/>
-              <a:t>5/18/18</a:t>
+              <a:t>7/19/18</a:t>
             </a:fld>
             <a:endParaRPr lang="en-US"/>
           </a:p>
@@ -1900,7 +1900,7 @@
           <a:p>
             <a:fld id="{DCC446B6-7B9C-A04B-98D9-80CC642E8FE6}" type="datetimeFigureOut">
               <a:rPr lang="en-US" smtClean="0"/>
-              <a:t>5/18/18</a:t>
+              <a:t>7/19/18</a:t>
             </a:fld>
             <a:endParaRPr lang="en-US"/>
           </a:p>
@@ -1995,7 +1995,7 @@
           <a:p>
             <a:fld id="{DCC446B6-7B9C-A04B-98D9-80CC642E8FE6}" type="datetimeFigureOut">
               <a:rPr lang="en-US" smtClean="0"/>
-              <a:t>5/18/18</a:t>
+              <a:t>7/19/18</a:t>
             </a:fld>
             <a:endParaRPr lang="en-US"/>
           </a:p>
@@ -2272,7 +2272,7 @@
           <a:p>
             <a:fld id="{DCC446B6-7B9C-A04B-98D9-80CC642E8FE6}" type="datetimeFigureOut">
               <a:rPr lang="en-US" smtClean="0"/>
-              <a:t>5/18/18</a:t>
+              <a:t>7/19/18</a:t>
             </a:fld>
             <a:endParaRPr lang="en-US"/>
           </a:p>
@@ -2525,7 +2525,7 @@
           <a:p>
             <a:fld id="{DCC446B6-7B9C-A04B-98D9-80CC642E8FE6}" type="datetimeFigureOut">
               <a:rPr lang="en-US" smtClean="0"/>
-              <a:t>5/18/18</a:t>
+              <a:t>7/19/18</a:t>
             </a:fld>
             <a:endParaRPr lang="en-US"/>
           </a:p>
@@ -2738,7 +2738,7 @@
           <a:p>
             <a:fld id="{DCC446B6-7B9C-A04B-98D9-80CC642E8FE6}" type="datetimeFigureOut">
               <a:rPr lang="en-US" smtClean="0"/>
-              <a:t>5/18/18</a:t>
+              <a:t>7/19/18</a:t>
             </a:fld>
             <a:endParaRPr lang="en-US"/>
           </a:p>
@@ -12321,9 +12321,9 @@
           <p:nvPr/>
         </p:nvCxnSpPr>
         <p:spPr>
-          <a:xfrm rot="5400000">
-            <a:off x="4002736" y="5555053"/>
-            <a:ext cx="358814" cy="6351"/>
+          <a:xfrm rot="16200000" flipH="1">
+            <a:off x="3738275" y="5296943"/>
+            <a:ext cx="593248" cy="288135"/>
           </a:xfrm>
           <a:prstGeom prst="bentConnector3">
             <a:avLst>
@@ -12484,19 +12484,103 @@
           </a:p>
         </p:txBody>
       </p:sp>
-      <p:cxnSp>
-        <p:nvCxnSpPr>
-          <p:cNvPr id="13" name="Elbow Connector 12"/>
-          <p:cNvCxnSpPr>
-            <a:stCxn id="46" idx="0"/>
-            <a:endCxn id="12" idx="2"/>
+      <p:sp>
+        <p:nvSpPr>
+          <p:cNvPr id="15" name="Oval 14"/>
+          <p:cNvSpPr/>
+          <p:nvPr/>
+        </p:nvSpPr>
+        <p:spPr>
+          <a:xfrm>
+            <a:off x="5588667" y="6106967"/>
+            <a:ext cx="3478829" cy="468868"/>
+          </a:xfrm>
+          <a:prstGeom prst="ellipse">
+            <a:avLst/>
+          </a:prstGeom>
+        </p:spPr>
+        <p:style>
+          <a:lnRef idx="1">
+            <a:schemeClr val="accent1"/>
+          </a:lnRef>
+          <a:fillRef idx="3">
+            <a:schemeClr val="accent1"/>
+          </a:fillRef>
+          <a:effectRef idx="2">
+            <a:schemeClr val="accent1"/>
+          </a:effectRef>
+          <a:fontRef idx="minor">
+            <a:schemeClr val="lt1"/>
+          </a:fontRef>
+        </p:style>
+        <p:txBody>
+          <a:bodyPr rtlCol="0" anchor="ctr"/>
+          <a:lstStyle/>
+          <a:p>
+            <a:pPr algn="ctr"/>
+            <a:r>
+              <a:rPr lang="en-US" sz="1400" dirty="0" err="1" smtClean="0"/>
+              <a:t>summarize_xiaohong_pASCAT_differences.py</a:t>
+            </a:r>
+            <a:endParaRPr lang="en-US" sz="1400" dirty="0"/>
+          </a:p>
+        </p:txBody>
+      </p:sp>
+      <p:sp>
+        <p:nvSpPr>
+          <p:cNvPr id="51" name="Oval 50"/>
+          <p:cNvSpPr/>
+          <p:nvPr/>
+        </p:nvSpPr>
+        <p:spPr>
+          <a:xfrm>
+            <a:off x="1959054" y="4675519"/>
+            <a:ext cx="3863555" cy="468868"/>
+          </a:xfrm>
+          <a:prstGeom prst="ellipse">
+            <a:avLst/>
+          </a:prstGeom>
+        </p:spPr>
+        <p:style>
+          <a:lnRef idx="1">
+            <a:schemeClr val="accent1"/>
+          </a:lnRef>
+          <a:fillRef idx="3">
+            <a:schemeClr val="accent1"/>
+          </a:fillRef>
+          <a:effectRef idx="2">
+            <a:schemeClr val="accent1"/>
+          </a:effectRef>
+          <a:fontRef idx="minor">
+            <a:schemeClr val="lt1"/>
+          </a:fontRef>
+        </p:style>
+        <p:txBody>
+          <a:bodyPr rtlCol="0" anchor="ctr"/>
+          <a:lstStyle/>
+          <a:p>
+            <a:pPr algn="ctr"/>
+            <a:r>
+              <a:rPr lang="en-US" sz="1400" dirty="0" err="1" smtClean="0"/>
+              <a:t>compare_Xiaohong_to_ASCAT.py</a:t>
+            </a:r>
+            <a:endParaRPr lang="en-US" sz="1400" dirty="0" smtClean="0"/>
+          </a:p>
+        </p:txBody>
+      </p:sp>
+      <p:cxnSp>
+        <p:nvCxnSpPr>
+          <p:cNvPr id="66" name="Elbow Connector 65"/>
+          <p:cNvCxnSpPr>
+            <a:stCxn id="51" idx="0"/>
+            <a:endCxn id="2" idx="2"/>
           </p:cNvCxnSpPr>
           <p:nvPr/>
         </p:nvCxnSpPr>
         <p:spPr>
           <a:xfrm rot="16200000" flipV="1">
-            <a:off x="1202870" y="1506856"/>
-            <a:ext cx="229815" cy="541197"/>
+            <a:off x="2255845" y="3040532"/>
+            <a:ext cx="3012972" cy="257002"/>
           </a:xfrm>
           <a:prstGeom prst="bentConnector3">
             <a:avLst>
@@ -12519,16 +12603,51 @@
           </a:fontRef>
         </p:style>
       </p:cxnSp>
-      <p:sp>
-        <p:nvSpPr>
-          <p:cNvPr id="15" name="Oval 14"/>
+      <p:cxnSp>
+        <p:nvCxnSpPr>
+          <p:cNvPr id="99" name="Elbow Connector 98"/>
+          <p:cNvCxnSpPr>
+            <a:stCxn id="15" idx="3"/>
+            <a:endCxn id="7" idx="2"/>
+          </p:cNvCxnSpPr>
+          <p:nvPr/>
+        </p:nvCxnSpPr>
+        <p:spPr>
+          <a:xfrm rot="5400000" flipH="1">
+            <a:off x="4938447" y="5347488"/>
+            <a:ext cx="400204" cy="1919163"/>
+          </a:xfrm>
+          <a:prstGeom prst="bentConnector3">
+            <a:avLst>
+              <a:gd name="adj1" fmla="val -74278"/>
+            </a:avLst>
+          </a:prstGeom>
+        </p:spPr>
+        <p:style>
+          <a:lnRef idx="2">
+            <a:schemeClr val="accent1"/>
+          </a:lnRef>
+          <a:fillRef idx="0">
+            <a:schemeClr val="accent1"/>
+          </a:fillRef>
+          <a:effectRef idx="1">
+            <a:schemeClr val="accent1"/>
+          </a:effectRef>
+          <a:fontRef idx="minor">
+            <a:schemeClr val="tx1"/>
+          </a:fontRef>
+        </p:style>
+      </p:cxnSp>
+      <p:sp>
+        <p:nvSpPr>
+          <p:cNvPr id="38" name="Oval 37"/>
           <p:cNvSpPr/>
           <p:nvPr/>
         </p:nvSpPr>
         <p:spPr>
           <a:xfrm>
-            <a:off x="5588667" y="6106967"/>
-            <a:ext cx="3478829" cy="468868"/>
+            <a:off x="4637475" y="824347"/>
+            <a:ext cx="3977511" cy="468868"/>
           </a:xfrm>
           <a:prstGeom prst="ellipse">
             <a:avLst/>
@@ -12555,91 +12674,7 @@
             <a:pPr algn="ctr"/>
             <a:r>
               <a:rPr lang="en-US" sz="1400" dirty="0" err="1" smtClean="0"/>
-              <a:t>summarize_xiaohong_pASCAT_differences.py</a:t>
-            </a:r>
-            <a:endParaRPr lang="en-US" sz="1400" dirty="0"/>
-          </a:p>
-        </p:txBody>
-      </p:sp>
-      <p:sp>
-        <p:nvSpPr>
-          <p:cNvPr id="46" name="Oval 45"/>
-          <p:cNvSpPr/>
-          <p:nvPr/>
-        </p:nvSpPr>
-        <p:spPr>
-          <a:xfrm>
-            <a:off x="184053" y="1892362"/>
-            <a:ext cx="2808643" cy="468868"/>
-          </a:xfrm>
-          <a:prstGeom prst="ellipse">
-            <a:avLst/>
-          </a:prstGeom>
-        </p:spPr>
-        <p:style>
-          <a:lnRef idx="1">
-            <a:schemeClr val="accent1"/>
-          </a:lnRef>
-          <a:fillRef idx="3">
-            <a:schemeClr val="accent1"/>
-          </a:fillRef>
-          <a:effectRef idx="2">
-            <a:schemeClr val="accent1"/>
-          </a:effectRef>
-          <a:fontRef idx="minor">
-            <a:schemeClr val="lt1"/>
-          </a:fontRef>
-        </p:style>
-        <p:txBody>
-          <a:bodyPr rtlCol="0" anchor="ctr"/>
-          <a:lstStyle/>
-          <a:p>
-            <a:pPr algn="ctr"/>
-            <a:r>
-              <a:rPr lang="en-US" sz="1400" dirty="0" err="1" smtClean="0"/>
-              <a:t>choose_best_analysis.py</a:t>
-            </a:r>
-            <a:endParaRPr lang="en-US" sz="1400" dirty="0"/>
-          </a:p>
-        </p:txBody>
-      </p:sp>
-      <p:sp>
-        <p:nvSpPr>
-          <p:cNvPr id="51" name="Oval 50"/>
-          <p:cNvSpPr/>
-          <p:nvPr/>
-        </p:nvSpPr>
-        <p:spPr>
-          <a:xfrm>
-            <a:off x="2253540" y="4909953"/>
-            <a:ext cx="3863555" cy="468868"/>
-          </a:xfrm>
-          <a:prstGeom prst="ellipse">
-            <a:avLst/>
-          </a:prstGeom>
-        </p:spPr>
-        <p:style>
-          <a:lnRef idx="1">
-            <a:schemeClr val="accent1"/>
-          </a:lnRef>
-          <a:fillRef idx="3">
-            <a:schemeClr val="accent1"/>
-          </a:fillRef>
-          <a:effectRef idx="2">
-            <a:schemeClr val="accent1"/>
-          </a:effectRef>
-          <a:fontRef idx="minor">
-            <a:schemeClr val="lt1"/>
-          </a:fontRef>
-        </p:style>
-        <p:txBody>
-          <a:bodyPr rtlCol="0" anchor="ctr"/>
-          <a:lstStyle/>
-          <a:p>
-            <a:pPr algn="ctr"/>
-            <a:r>
-              <a:rPr lang="en-US" sz="1400" dirty="0" err="1" smtClean="0"/>
-              <a:t>compare_Xiaohong_to_ASCAT.py</a:t>
+              <a:t>get_noninteger_CN_from_ASCAT.py</a:t>
             </a:r>
             <a:endParaRPr lang="en-US" sz="1400" dirty="0" smtClean="0"/>
           </a:p>
@@ -12647,17 +12682,85 @@
       </p:sp>
       <p:cxnSp>
         <p:nvCxnSpPr>
-          <p:cNvPr id="52" name="Elbow Connector 51"/>
-          <p:cNvCxnSpPr>
-            <a:stCxn id="53" idx="0"/>
-            <a:endCxn id="46" idx="4"/>
+          <p:cNvPr id="41" name="Elbow Connector 40"/>
+          <p:cNvCxnSpPr>
+            <a:stCxn id="38" idx="0"/>
+            <a:endCxn id="11" idx="3"/>
           </p:cNvCxnSpPr>
           <p:nvPr/>
         </p:nvCxnSpPr>
         <p:spPr>
           <a:xfrm rot="16200000" flipV="1">
-            <a:off x="1593683" y="2355922"/>
-            <a:ext cx="163942" cy="174557"/>
+            <a:off x="4248505" y="-1553380"/>
+            <a:ext cx="639681" cy="4115773"/>
+          </a:xfrm>
+          <a:prstGeom prst="bentConnector2">
+            <a:avLst/>
+          </a:prstGeom>
+        </p:spPr>
+        <p:style>
+          <a:lnRef idx="2">
+            <a:schemeClr val="accent1"/>
+          </a:lnRef>
+          <a:fillRef idx="0">
+            <a:schemeClr val="accent1"/>
+          </a:fillRef>
+          <a:effectRef idx="1">
+            <a:schemeClr val="accent1"/>
+          </a:effectRef>
+          <a:fontRef idx="minor">
+            <a:schemeClr val="tx1"/>
+          </a:fontRef>
+        </p:style>
+      </p:cxnSp>
+      <p:sp>
+        <p:nvSpPr>
+          <p:cNvPr id="67" name="TextBox 66"/>
+          <p:cNvSpPr txBox="1"/>
+          <p:nvPr/>
+        </p:nvSpPr>
+        <p:spPr>
+          <a:xfrm>
+            <a:off x="5904629" y="2194509"/>
+            <a:ext cx="1695745" cy="369332"/>
+          </a:xfrm>
+          <a:prstGeom prst="rect">
+            <a:avLst/>
+          </a:prstGeom>
+          <a:noFill/>
+        </p:spPr>
+        <p:txBody>
+          <a:bodyPr wrap="square" rtlCol="0">
+            <a:spAutoFit/>
+          </a:bodyPr>
+          <a:lstStyle/>
+          <a:p>
+            <a:pPr algn="ctr"/>
+            <a:r>
+              <a:rPr lang="en-US" dirty="0" err="1" smtClean="0"/>
+              <a:t>nonintegerCNs</a:t>
+            </a:r>
+            <a:r>
+              <a:rPr lang="en-US" dirty="0" smtClean="0"/>
+              <a:t>/</a:t>
+            </a:r>
+            <a:endParaRPr lang="en-US" dirty="0"/>
+          </a:p>
+        </p:txBody>
+      </p:sp>
+      <p:cxnSp>
+        <p:nvCxnSpPr>
+          <p:cNvPr id="68" name="Elbow Connector 67"/>
+          <p:cNvCxnSpPr>
+            <a:stCxn id="67" idx="0"/>
+            <a:endCxn id="38" idx="4"/>
+          </p:cNvCxnSpPr>
+          <p:nvPr/>
+        </p:nvCxnSpPr>
+        <p:spPr>
+          <a:xfrm rot="16200000" flipV="1">
+            <a:off x="6238720" y="1680726"/>
+            <a:ext cx="901294" cy="126271"/>
           </a:xfrm>
           <a:prstGeom prst="bentConnector3">
             <a:avLst>
@@ -12682,88 +12785,59 @@
       </p:cxnSp>
       <p:sp>
         <p:nvSpPr>
-          <p:cNvPr id="53" name="TextBox 52"/>
-          <p:cNvSpPr txBox="1"/>
-          <p:nvPr/>
-        </p:nvSpPr>
-        <p:spPr>
-          <a:xfrm>
-            <a:off x="976725" y="2525172"/>
-            <a:ext cx="1572414" cy="369332"/>
-          </a:xfrm>
-          <a:prstGeom prst="rect">
-            <a:avLst/>
-          </a:prstGeom>
-          <a:noFill/>
-        </p:spPr>
-        <p:txBody>
-          <a:bodyPr wrap="square" rtlCol="0">
-            <a:spAutoFit/>
-          </a:bodyPr>
-          <a:lstStyle/>
-          <a:p>
-            <a:pPr algn="ctr"/>
-            <a:r>
-              <a:rPr lang="en-US" dirty="0" err="1" smtClean="0"/>
-              <a:t>best_analyses</a:t>
-            </a:r>
-            <a:r>
-              <a:rPr lang="en-US" dirty="0" smtClean="0"/>
-              <a:t>/</a:t>
-            </a:r>
-            <a:endParaRPr lang="en-US" dirty="0"/>
-          </a:p>
-        </p:txBody>
-      </p:sp>
-      <p:cxnSp>
-        <p:nvCxnSpPr>
-          <p:cNvPr id="63" name="Elbow Connector 62"/>
-          <p:cNvCxnSpPr>
-            <a:stCxn id="38" idx="1"/>
-            <a:endCxn id="53" idx="3"/>
-          </p:cNvCxnSpPr>
-          <p:nvPr/>
-        </p:nvCxnSpPr>
-        <p:spPr>
-          <a:xfrm rot="16200000" flipH="1" flipV="1">
-            <a:off x="3050260" y="1488003"/>
-            <a:ext cx="720714" cy="1722955"/>
-          </a:xfrm>
-          <a:prstGeom prst="bentConnector4">
-            <a:avLst>
-              <a:gd name="adj1" fmla="val -31719"/>
-              <a:gd name="adj2" fmla="val 66904"/>
-            </a:avLst>
-          </a:prstGeom>
-        </p:spPr>
-        <p:style>
-          <a:lnRef idx="2">
-            <a:schemeClr val="accent1"/>
-          </a:lnRef>
-          <a:fillRef idx="0">
-            <a:schemeClr val="accent1"/>
-          </a:fillRef>
-          <a:effectRef idx="1">
-            <a:schemeClr val="accent1"/>
-          </a:effectRef>
-          <a:fontRef idx="minor">
-            <a:schemeClr val="tx1"/>
-          </a:fontRef>
-        </p:style>
-      </p:cxnSp>
-      <p:cxnSp>
-        <p:nvCxnSpPr>
-          <p:cNvPr id="66" name="Elbow Connector 65"/>
-          <p:cNvCxnSpPr>
-            <a:stCxn id="51" idx="0"/>
-            <a:endCxn id="2" idx="2"/>
-          </p:cNvCxnSpPr>
-          <p:nvPr/>
-        </p:nvCxnSpPr>
-        <p:spPr>
-          <a:xfrm rot="16200000" flipV="1">
-            <a:off x="2285871" y="3010506"/>
-            <a:ext cx="3247406" cy="551488"/>
+          <p:cNvPr id="74" name="Oval 73"/>
+          <p:cNvSpPr/>
+          <p:nvPr/>
+        </p:nvSpPr>
+        <p:spPr>
+          <a:xfrm>
+            <a:off x="5341913" y="3277109"/>
+            <a:ext cx="2821175" cy="468868"/>
+          </a:xfrm>
+          <a:prstGeom prst="ellipse">
+            <a:avLst/>
+          </a:prstGeom>
+        </p:spPr>
+        <p:style>
+          <a:lnRef idx="1">
+            <a:schemeClr val="accent1"/>
+          </a:lnRef>
+          <a:fillRef idx="3">
+            <a:schemeClr val="accent1"/>
+          </a:fillRef>
+          <a:effectRef idx="2">
+            <a:schemeClr val="accent1"/>
+          </a:effectRef>
+          <a:fontRef idx="minor">
+            <a:schemeClr val="lt1"/>
+          </a:fontRef>
+        </p:style>
+        <p:txBody>
+          <a:bodyPr rtlCol="0" anchor="ctr"/>
+          <a:lstStyle/>
+          <a:p>
+            <a:pPr algn="ctr"/>
+            <a:r>
+              <a:rPr lang="en-US" sz="1400" dirty="0" err="1" smtClean="0"/>
+              <a:t>re_call_segments.py</a:t>
+            </a:r>
+            <a:endParaRPr lang="en-US" sz="1400" dirty="0" smtClean="0"/>
+          </a:p>
+        </p:txBody>
+      </p:sp>
+      <p:cxnSp>
+        <p:nvCxnSpPr>
+          <p:cNvPr id="75" name="Elbow Connector 74"/>
+          <p:cNvCxnSpPr>
+            <a:stCxn id="74" idx="0"/>
+            <a:endCxn id="67" idx="2"/>
+          </p:cNvCxnSpPr>
+          <p:nvPr/>
+        </p:nvCxnSpPr>
+        <p:spPr>
+          <a:xfrm rot="5400000" flipH="1" flipV="1">
+            <a:off x="6395867" y="2920475"/>
+            <a:ext cx="713268" cy="1"/>
           </a:xfrm>
           <a:prstGeom prst="bentConnector3">
             <a:avLst>
@@ -12786,19 +12860,54 @@
           </a:fontRef>
         </p:style>
       </p:cxnSp>
-      <p:cxnSp>
-        <p:nvCxnSpPr>
-          <p:cNvPr id="69" name="Elbow Connector 68"/>
-          <p:cNvCxnSpPr>
-            <a:stCxn id="51" idx="0"/>
-            <a:endCxn id="53" idx="2"/>
-          </p:cNvCxnSpPr>
-          <p:nvPr/>
-        </p:nvCxnSpPr>
-        <p:spPr>
-          <a:xfrm rot="16200000" flipV="1">
-            <a:off x="1966401" y="2691036"/>
-            <a:ext cx="2015449" cy="2422386"/>
+      <p:sp>
+        <p:nvSpPr>
+          <p:cNvPr id="79" name="TextBox 78"/>
+          <p:cNvSpPr txBox="1"/>
+          <p:nvPr/>
+        </p:nvSpPr>
+        <p:spPr>
+          <a:xfrm>
+            <a:off x="5466385" y="3943356"/>
+            <a:ext cx="2825218" cy="369332"/>
+          </a:xfrm>
+          <a:prstGeom prst="rect">
+            <a:avLst/>
+          </a:prstGeom>
+          <a:noFill/>
+        </p:spPr>
+        <p:txBody>
+          <a:bodyPr wrap="square" rtlCol="0">
+            <a:spAutoFit/>
+          </a:bodyPr>
+          <a:lstStyle/>
+          <a:p>
+            <a:pPr algn="ctr"/>
+            <a:r>
+              <a:rPr lang="en-US" dirty="0" err="1" smtClean="0"/>
+              <a:t>noninteger_processed_CNs</a:t>
+            </a:r>
+            <a:r>
+              <a:rPr lang="en-US" dirty="0" smtClean="0"/>
+              <a:t>/</a:t>
+            </a:r>
+            <a:endParaRPr lang="en-US" dirty="0"/>
+          </a:p>
+        </p:txBody>
+      </p:sp>
+      <p:cxnSp>
+        <p:nvCxnSpPr>
+          <p:cNvPr id="80" name="Elbow Connector 79"/>
+          <p:cNvCxnSpPr>
+            <a:stCxn id="74" idx="2"/>
+            <a:endCxn id="2" idx="3"/>
+          </p:cNvCxnSpPr>
+          <p:nvPr/>
+        </p:nvCxnSpPr>
+        <p:spPr>
+          <a:xfrm rot="10800000">
+            <a:off x="4481703" y="1477881"/>
+            <a:ext cx="860211" cy="2033662"/>
           </a:xfrm>
           <a:prstGeom prst="bentConnector3">
             <a:avLst>
@@ -12823,162 +12932,17 @@
       </p:cxnSp>
       <p:cxnSp>
         <p:nvCxnSpPr>
-          <p:cNvPr id="99" name="Elbow Connector 98"/>
-          <p:cNvCxnSpPr>
-            <a:stCxn id="15" idx="3"/>
-            <a:endCxn id="7" idx="2"/>
-          </p:cNvCxnSpPr>
-          <p:nvPr/>
-        </p:nvCxnSpPr>
-        <p:spPr>
-          <a:xfrm rot="5400000" flipH="1">
-            <a:off x="4938447" y="5347488"/>
-            <a:ext cx="400204" cy="1919163"/>
-          </a:xfrm>
-          <a:prstGeom prst="bentConnector3">
-            <a:avLst>
-              <a:gd name="adj1" fmla="val -74278"/>
-            </a:avLst>
-          </a:prstGeom>
-        </p:spPr>
-        <p:style>
-          <a:lnRef idx="2">
-            <a:schemeClr val="accent1"/>
-          </a:lnRef>
-          <a:fillRef idx="0">
-            <a:schemeClr val="accent1"/>
-          </a:fillRef>
-          <a:effectRef idx="1">
-            <a:schemeClr val="accent1"/>
-          </a:effectRef>
-          <a:fontRef idx="minor">
-            <a:schemeClr val="tx1"/>
-          </a:fontRef>
-        </p:style>
-      </p:cxnSp>
-      <p:sp>
-        <p:nvSpPr>
-          <p:cNvPr id="38" name="Oval 37"/>
-          <p:cNvSpPr/>
-          <p:nvPr/>
-        </p:nvSpPr>
-        <p:spPr>
-          <a:xfrm>
-            <a:off x="3689601" y="1920460"/>
-            <a:ext cx="3977511" cy="468868"/>
-          </a:xfrm>
-          <a:prstGeom prst="ellipse">
-            <a:avLst/>
-          </a:prstGeom>
-        </p:spPr>
-        <p:style>
-          <a:lnRef idx="1">
-            <a:schemeClr val="accent1"/>
-          </a:lnRef>
-          <a:fillRef idx="3">
-            <a:schemeClr val="accent1"/>
-          </a:fillRef>
-          <a:effectRef idx="2">
-            <a:schemeClr val="accent1"/>
-          </a:effectRef>
-          <a:fontRef idx="minor">
-            <a:schemeClr val="lt1"/>
-          </a:fontRef>
-        </p:style>
-        <p:txBody>
-          <a:bodyPr rtlCol="0" anchor="ctr"/>
-          <a:lstStyle/>
-          <a:p>
-            <a:pPr algn="ctr"/>
-            <a:r>
-              <a:rPr lang="en-US" sz="1400" dirty="0" err="1" smtClean="0"/>
-              <a:t>get_noninteger_CN_from_ASCAT.py</a:t>
-            </a:r>
-            <a:endParaRPr lang="en-US" sz="1400" dirty="0" smtClean="0"/>
-          </a:p>
-        </p:txBody>
-      </p:sp>
-      <p:cxnSp>
-        <p:nvCxnSpPr>
-          <p:cNvPr id="41" name="Elbow Connector 40"/>
-          <p:cNvCxnSpPr>
-            <a:stCxn id="38" idx="0"/>
-            <a:endCxn id="11" idx="3"/>
+          <p:cNvPr id="83" name="Elbow Connector 82"/>
+          <p:cNvCxnSpPr>
+            <a:stCxn id="79" idx="0"/>
+            <a:endCxn id="74" idx="4"/>
           </p:cNvCxnSpPr>
           <p:nvPr/>
         </p:nvCxnSpPr>
         <p:spPr>
           <a:xfrm rot="16200000" flipV="1">
-            <a:off x="3226511" y="-531387"/>
-            <a:ext cx="1735794" cy="3167899"/>
-          </a:xfrm>
-          <a:prstGeom prst="bentConnector2">
-            <a:avLst/>
-          </a:prstGeom>
-        </p:spPr>
-        <p:style>
-          <a:lnRef idx="2">
-            <a:schemeClr val="accent1"/>
-          </a:lnRef>
-          <a:fillRef idx="0">
-            <a:schemeClr val="accent1"/>
-          </a:fillRef>
-          <a:effectRef idx="1">
-            <a:schemeClr val="accent1"/>
-          </a:effectRef>
-          <a:fontRef idx="minor">
-            <a:schemeClr val="tx1"/>
-          </a:fontRef>
-        </p:style>
-      </p:cxnSp>
-      <p:sp>
-        <p:nvSpPr>
-          <p:cNvPr id="67" name="TextBox 66"/>
-          <p:cNvSpPr txBox="1"/>
-          <p:nvPr/>
-        </p:nvSpPr>
-        <p:spPr>
-          <a:xfrm>
-            <a:off x="5417693" y="2709837"/>
-            <a:ext cx="1695745" cy="369332"/>
-          </a:xfrm>
-          <a:prstGeom prst="rect">
-            <a:avLst/>
-          </a:prstGeom>
-          <a:noFill/>
-        </p:spPr>
-        <p:txBody>
-          <a:bodyPr wrap="square" rtlCol="0">
-            <a:spAutoFit/>
-          </a:bodyPr>
-          <a:lstStyle/>
-          <a:p>
-            <a:pPr algn="ctr"/>
-            <a:r>
-              <a:rPr lang="en-US" dirty="0" err="1" smtClean="0"/>
-              <a:t>nonintegerCNs</a:t>
-            </a:r>
-            <a:r>
-              <a:rPr lang="en-US" dirty="0" smtClean="0"/>
-              <a:t>/</a:t>
-            </a:r>
-            <a:endParaRPr lang="en-US" dirty="0"/>
-          </a:p>
-        </p:txBody>
-      </p:sp>
-      <p:cxnSp>
-        <p:nvCxnSpPr>
-          <p:cNvPr id="68" name="Elbow Connector 67"/>
-          <p:cNvCxnSpPr>
-            <a:stCxn id="67" idx="0"/>
-            <a:endCxn id="38" idx="4"/>
-          </p:cNvCxnSpPr>
-          <p:nvPr/>
-        </p:nvCxnSpPr>
-        <p:spPr>
-          <a:xfrm rot="16200000" flipV="1">
-            <a:off x="5811708" y="2255978"/>
-            <a:ext cx="320509" cy="587209"/>
+            <a:off x="6717059" y="3781420"/>
+            <a:ext cx="197379" cy="126493"/>
           </a:xfrm>
           <a:prstGeom prst="bentConnector3">
             <a:avLst>
@@ -13001,204 +12965,24 @@
           </a:fontRef>
         </p:style>
       </p:cxnSp>
-      <p:sp>
-        <p:nvSpPr>
-          <p:cNvPr id="74" name="Oval 73"/>
-          <p:cNvSpPr/>
-          <p:nvPr/>
-        </p:nvSpPr>
-        <p:spPr>
-          <a:xfrm>
-            <a:off x="5341913" y="3277109"/>
-            <a:ext cx="2821175" cy="468868"/>
-          </a:xfrm>
-          <a:prstGeom prst="ellipse">
-            <a:avLst/>
-          </a:prstGeom>
-        </p:spPr>
-        <p:style>
-          <a:lnRef idx="1">
-            <a:schemeClr val="accent1"/>
-          </a:lnRef>
-          <a:fillRef idx="3">
-            <a:schemeClr val="accent1"/>
-          </a:fillRef>
-          <a:effectRef idx="2">
-            <a:schemeClr val="accent1"/>
-          </a:effectRef>
-          <a:fontRef idx="minor">
-            <a:schemeClr val="lt1"/>
-          </a:fontRef>
-        </p:style>
-        <p:txBody>
-          <a:bodyPr rtlCol="0" anchor="ctr"/>
-          <a:lstStyle/>
-          <a:p>
-            <a:pPr algn="ctr"/>
-            <a:r>
-              <a:rPr lang="en-US" sz="1400" dirty="0" err="1" smtClean="0"/>
-              <a:t>re_call_segments.py</a:t>
-            </a:r>
-            <a:endParaRPr lang="en-US" sz="1400" dirty="0" smtClean="0"/>
-          </a:p>
-        </p:txBody>
-      </p:sp>
-      <p:cxnSp>
-        <p:nvCxnSpPr>
-          <p:cNvPr id="75" name="Elbow Connector 74"/>
-          <p:cNvCxnSpPr>
-            <a:stCxn id="74" idx="0"/>
-            <a:endCxn id="67" idx="2"/>
+      <p:cxnSp>
+        <p:nvCxnSpPr>
+          <p:cNvPr id="90" name="Elbow Connector 89"/>
+          <p:cNvCxnSpPr>
+            <a:stCxn id="51" idx="1"/>
+            <a:endCxn id="11" idx="1"/>
           </p:cNvCxnSpPr>
           <p:nvPr/>
         </p:nvCxnSpPr>
         <p:spPr>
           <a:xfrm rot="16200000" flipV="1">
-            <a:off x="6410064" y="2934671"/>
-            <a:ext cx="197940" cy="486935"/>
-          </a:xfrm>
-          <a:prstGeom prst="bentConnector3">
-            <a:avLst>
-              <a:gd name="adj1" fmla="val 50000"/>
-            </a:avLst>
-          </a:prstGeom>
-        </p:spPr>
-        <p:style>
-          <a:lnRef idx="2">
-            <a:schemeClr val="accent1"/>
-          </a:lnRef>
-          <a:fillRef idx="0">
-            <a:schemeClr val="accent1"/>
-          </a:fillRef>
-          <a:effectRef idx="1">
-            <a:schemeClr val="accent1"/>
-          </a:effectRef>
-          <a:fontRef idx="minor">
-            <a:schemeClr val="tx1"/>
-          </a:fontRef>
-        </p:style>
-      </p:cxnSp>
-      <p:sp>
-        <p:nvSpPr>
-          <p:cNvPr id="79" name="TextBox 78"/>
-          <p:cNvSpPr txBox="1"/>
-          <p:nvPr/>
-        </p:nvSpPr>
-        <p:spPr>
-          <a:xfrm>
-            <a:off x="5466385" y="3943356"/>
-            <a:ext cx="2825218" cy="369332"/>
-          </a:xfrm>
-          <a:prstGeom prst="rect">
-            <a:avLst/>
-          </a:prstGeom>
-          <a:noFill/>
-        </p:spPr>
-        <p:txBody>
-          <a:bodyPr wrap="square" rtlCol="0">
-            <a:spAutoFit/>
-          </a:bodyPr>
-          <a:lstStyle/>
-          <a:p>
-            <a:pPr algn="ctr"/>
-            <a:r>
-              <a:rPr lang="en-US" dirty="0" err="1" smtClean="0"/>
-              <a:t>noninteger_processed_CNs</a:t>
-            </a:r>
-            <a:r>
-              <a:rPr lang="en-US" dirty="0" smtClean="0"/>
-              <a:t>/</a:t>
-            </a:r>
-            <a:endParaRPr lang="en-US" dirty="0"/>
-          </a:p>
-        </p:txBody>
-      </p:sp>
-      <p:cxnSp>
-        <p:nvCxnSpPr>
-          <p:cNvPr id="80" name="Elbow Connector 79"/>
-          <p:cNvCxnSpPr>
-            <a:stCxn id="74" idx="7"/>
-            <a:endCxn id="2" idx="3"/>
-          </p:cNvCxnSpPr>
-          <p:nvPr/>
-        </p:nvCxnSpPr>
-        <p:spPr>
-          <a:xfrm rot="16200000" flipV="1">
-            <a:off x="5181873" y="777710"/>
-            <a:ext cx="1867892" cy="3268234"/>
-          </a:xfrm>
-          <a:prstGeom prst="bentConnector2">
-            <a:avLst/>
-          </a:prstGeom>
-        </p:spPr>
-        <p:style>
-          <a:lnRef idx="2">
-            <a:schemeClr val="accent1"/>
-          </a:lnRef>
-          <a:fillRef idx="0">
-            <a:schemeClr val="accent1"/>
-          </a:fillRef>
-          <a:effectRef idx="1">
-            <a:schemeClr val="accent1"/>
-          </a:effectRef>
-          <a:fontRef idx="minor">
-            <a:schemeClr val="tx1"/>
-          </a:fontRef>
-        </p:style>
-      </p:cxnSp>
-      <p:cxnSp>
-        <p:nvCxnSpPr>
-          <p:cNvPr id="83" name="Elbow Connector 82"/>
-          <p:cNvCxnSpPr>
-            <a:stCxn id="79" idx="0"/>
-            <a:endCxn id="74" idx="4"/>
-          </p:cNvCxnSpPr>
-          <p:nvPr/>
-        </p:nvCxnSpPr>
-        <p:spPr>
-          <a:xfrm rot="16200000" flipV="1">
-            <a:off x="6717059" y="3781420"/>
-            <a:ext cx="197379" cy="126493"/>
-          </a:xfrm>
-          <a:prstGeom prst="bentConnector3">
-            <a:avLst>
-              <a:gd name="adj1" fmla="val 50000"/>
-            </a:avLst>
-          </a:prstGeom>
-        </p:spPr>
-        <p:style>
-          <a:lnRef idx="2">
-            <a:schemeClr val="accent1"/>
-          </a:lnRef>
-          <a:fillRef idx="0">
-            <a:schemeClr val="accent1"/>
-          </a:fillRef>
-          <a:effectRef idx="1">
-            <a:schemeClr val="accent1"/>
-          </a:effectRef>
-          <a:fontRef idx="minor">
-            <a:schemeClr val="tx1"/>
-          </a:fontRef>
-        </p:style>
-      </p:cxnSp>
-      <p:cxnSp>
-        <p:nvCxnSpPr>
-          <p:cNvPr id="90" name="Elbow Connector 89"/>
-          <p:cNvCxnSpPr>
-            <a:stCxn id="51" idx="0"/>
-            <a:endCxn id="11" idx="1"/>
-          </p:cNvCxnSpPr>
-          <p:nvPr/>
-        </p:nvCxnSpPr>
-        <p:spPr>
-          <a:xfrm rot="16200000" flipV="1">
-            <a:off x="-120890" y="603745"/>
-            <a:ext cx="4725287" cy="3887130"/>
+            <a:off x="-868234" y="1351089"/>
+            <a:ext cx="4559517" cy="2226671"/>
           </a:xfrm>
           <a:prstGeom prst="bentConnector4">
             <a:avLst>
-              <a:gd name="adj1" fmla="val 6370"/>
-              <a:gd name="adj2" fmla="val 105881"/>
+              <a:gd name="adj1" fmla="val 5848"/>
+              <a:gd name="adj2" fmla="val 110266"/>
             </a:avLst>
           </a:prstGeom>
         </p:spPr>
@@ -13221,15 +13005,15 @@
         <p:nvCxnSpPr>
           <p:cNvPr id="98" name="Elbow Connector 97"/>
           <p:cNvCxnSpPr>
-            <a:stCxn id="51" idx="0"/>
+            <a:stCxn id="51" idx="7"/>
             <a:endCxn id="79" idx="2"/>
           </p:cNvCxnSpPr>
           <p:nvPr/>
         </p:nvCxnSpPr>
         <p:spPr>
           <a:xfrm rot="5400000" flipH="1" flipV="1">
-            <a:off x="5233524" y="3264483"/>
-            <a:ext cx="597265" cy="2693676"/>
+            <a:off x="5852152" y="3717341"/>
+            <a:ext cx="431495" cy="1622190"/>
           </a:xfrm>
           <a:prstGeom prst="bentConnector3">
             <a:avLst>

</xml_diff>

<commit_message>
Update input for assemble ploidy evidence.
</commit_message>
<xml_diff>
--- a/Python program structure.pptx
+++ b/Python program structure.pptx
@@ -13833,7 +13833,7 @@
         </p:nvSpPr>
         <p:spPr>
           <a:xfrm>
-            <a:off x="1" y="268353"/>
+            <a:off x="0" y="1158685"/>
             <a:ext cx="5015450" cy="338554"/>
           </a:xfrm>
           <a:prstGeom prst="rect">
@@ -13875,8 +13875,8 @@
         </p:nvCxnSpPr>
         <p:spPr>
           <a:xfrm rot="16200000" flipH="1">
-            <a:off x="3039025" y="75607"/>
-            <a:ext cx="448364" cy="1510963"/>
+            <a:off x="3471551" y="533413"/>
+            <a:ext cx="448362" cy="2376014"/>
           </a:xfrm>
           <a:prstGeom prst="bentConnector3">
             <a:avLst>
@@ -13907,7 +13907,7 @@
         </p:nvSpPr>
         <p:spPr>
           <a:xfrm>
-            <a:off x="2279274" y="1055271"/>
+            <a:off x="3144324" y="1945601"/>
             <a:ext cx="3478829" cy="468868"/>
           </a:xfrm>
           <a:prstGeom prst="ellipse">
@@ -13949,7 +13949,7 @@
         </p:nvSpPr>
         <p:spPr>
           <a:xfrm>
-            <a:off x="5015450" y="268353"/>
+            <a:off x="5015449" y="1158685"/>
             <a:ext cx="4128550" cy="369332"/>
           </a:xfrm>
           <a:prstGeom prst="rect">
@@ -13989,8 +13989,8 @@
         </p:nvCxnSpPr>
         <p:spPr>
           <a:xfrm rot="5400000">
-            <a:off x="5340414" y="-684040"/>
-            <a:ext cx="417586" cy="3061036"/>
+            <a:off x="5772940" y="638817"/>
+            <a:ext cx="417584" cy="2195985"/>
           </a:xfrm>
           <a:prstGeom prst="bentConnector3">
             <a:avLst>
@@ -14021,7 +14021,7 @@
         </p:nvSpPr>
         <p:spPr>
           <a:xfrm>
-            <a:off x="2492292" y="1945604"/>
+            <a:off x="2492291" y="2835936"/>
             <a:ext cx="3071199" cy="369332"/>
           </a:xfrm>
           <a:prstGeom prst="rect">
@@ -14060,9 +14060,9 @@
           <p:nvPr/>
         </p:nvCxnSpPr>
         <p:spPr>
-          <a:xfrm rot="16200000" flipH="1">
-            <a:off x="3812558" y="1730269"/>
-            <a:ext cx="421465" cy="9203"/>
+          <a:xfrm rot="5400000">
+            <a:off x="4245082" y="2197278"/>
+            <a:ext cx="421467" cy="855848"/>
           </a:xfrm>
           <a:prstGeom prst="bentConnector3">
             <a:avLst>
@@ -14093,7 +14093,7 @@
         </p:nvSpPr>
         <p:spPr>
           <a:xfrm>
-            <a:off x="2287279" y="2891689"/>
+            <a:off x="4661566" y="4094898"/>
             <a:ext cx="3478829" cy="468868"/>
           </a:xfrm>
           <a:prstGeom prst="ellipse">
@@ -14135,7 +14135,7 @@
         </p:nvSpPr>
         <p:spPr>
           <a:xfrm>
-            <a:off x="2130828" y="3782022"/>
+            <a:off x="4505115" y="4985231"/>
             <a:ext cx="3804881" cy="369332"/>
           </a:xfrm>
           <a:prstGeom prst="rect">
@@ -14175,7 +14175,7 @@
         </p:nvCxnSpPr>
         <p:spPr>
           <a:xfrm rot="16200000" flipH="1">
-            <a:off x="3819249" y="3568001"/>
+            <a:off x="6193536" y="4771210"/>
             <a:ext cx="421465" cy="6575"/>
           </a:xfrm>
           <a:prstGeom prst="bentConnector3">
@@ -14209,9 +14209,333 @@
           <p:nvPr/>
         </p:nvCxnSpPr>
         <p:spPr>
+          <a:xfrm rot="16200000" flipH="1">
+            <a:off x="4769621" y="2463538"/>
+            <a:ext cx="889630" cy="2373090"/>
+          </a:xfrm>
+          <a:prstGeom prst="bentConnector3">
+            <a:avLst>
+              <a:gd name="adj1" fmla="val 50000"/>
+            </a:avLst>
+          </a:prstGeom>
+        </p:spPr>
+        <p:style>
+          <a:lnRef idx="2">
+            <a:schemeClr val="accent1"/>
+          </a:lnRef>
+          <a:fillRef idx="0">
+            <a:schemeClr val="accent1"/>
+          </a:fillRef>
+          <a:effectRef idx="1">
+            <a:schemeClr val="accent1"/>
+          </a:effectRef>
+          <a:fontRef idx="minor">
+            <a:schemeClr val="tx1"/>
+          </a:fontRef>
+        </p:style>
+      </p:cxnSp>
+      <p:sp>
+        <p:nvSpPr>
+          <p:cNvPr id="13" name="Oval 12"/>
+          <p:cNvSpPr/>
+          <p:nvPr/>
+        </p:nvSpPr>
+        <p:spPr>
+          <a:xfrm>
+            <a:off x="539858" y="3782469"/>
+            <a:ext cx="3478829" cy="468868"/>
+          </a:xfrm>
+          <a:prstGeom prst="ellipse">
+            <a:avLst/>
+          </a:prstGeom>
+        </p:spPr>
+        <p:style>
+          <a:lnRef idx="1">
+            <a:schemeClr val="accent1"/>
+          </a:lnRef>
+          <a:fillRef idx="3">
+            <a:schemeClr val="accent1"/>
+          </a:fillRef>
+          <a:effectRef idx="2">
+            <a:schemeClr val="accent1"/>
+          </a:effectRef>
+          <a:fontRef idx="minor">
+            <a:schemeClr val="lt1"/>
+          </a:fontRef>
+        </p:style>
+        <p:txBody>
+          <a:bodyPr rtlCol="0" anchor="ctr"/>
+          <a:lstStyle/>
+          <a:p>
+            <a:pPr algn="ctr"/>
+            <a:r>
+              <a:rPr lang="en-US" sz="1400" dirty="0" err="1" smtClean="0"/>
+              <a:t>count</a:t>
+            </a:r>
+            <a:r>
+              <a:rPr lang="en-US" sz="1400" dirty="0" err="1" smtClean="0"/>
+              <a:t>_ploidy_evidence.py</a:t>
+            </a:r>
+            <a:endParaRPr lang="en-US" sz="1400" dirty="0" smtClean="0"/>
+          </a:p>
+        </p:txBody>
+      </p:sp>
+      <p:cxnSp>
+        <p:nvCxnSpPr>
+          <p:cNvPr id="16" name="Elbow Connector 15"/>
+          <p:cNvCxnSpPr>
+            <a:stCxn id="47" idx="2"/>
+            <a:endCxn id="13" idx="0"/>
+          </p:cNvCxnSpPr>
+          <p:nvPr/>
+        </p:nvCxnSpPr>
+        <p:spPr>
           <a:xfrm rot="5400000">
-            <a:off x="3738917" y="2602713"/>
-            <a:ext cx="576753" cy="1198"/>
+            <a:off x="2864982" y="2619559"/>
+            <a:ext cx="577201" cy="1748618"/>
+          </a:xfrm>
+          <a:prstGeom prst="bentConnector3">
+            <a:avLst>
+              <a:gd name="adj1" fmla="val 50000"/>
+            </a:avLst>
+          </a:prstGeom>
+        </p:spPr>
+        <p:style>
+          <a:lnRef idx="2">
+            <a:schemeClr val="accent1"/>
+          </a:lnRef>
+          <a:fillRef idx="0">
+            <a:schemeClr val="accent1"/>
+          </a:fillRef>
+          <a:effectRef idx="1">
+            <a:schemeClr val="accent1"/>
+          </a:effectRef>
+          <a:fontRef idx="minor">
+            <a:schemeClr val="tx1"/>
+          </a:fontRef>
+        </p:style>
+      </p:cxnSp>
+      <p:cxnSp>
+        <p:nvCxnSpPr>
+          <p:cNvPr id="19" name="Elbow Connector 18"/>
+          <p:cNvCxnSpPr>
+            <a:stCxn id="13" idx="4"/>
+            <a:endCxn id="56" idx="2"/>
+          </p:cNvCxnSpPr>
+          <p:nvPr/>
+        </p:nvCxnSpPr>
+        <p:spPr>
+          <a:xfrm rot="16200000" flipH="1">
+            <a:off x="3431422" y="3099187"/>
+            <a:ext cx="77995" cy="2382293"/>
+          </a:xfrm>
+          <a:prstGeom prst="bentConnector2">
+            <a:avLst/>
+          </a:prstGeom>
+        </p:spPr>
+        <p:style>
+          <a:lnRef idx="2">
+            <a:schemeClr val="accent1"/>
+          </a:lnRef>
+          <a:fillRef idx="0">
+            <a:schemeClr val="accent1"/>
+          </a:fillRef>
+          <a:effectRef idx="1">
+            <a:schemeClr val="accent1"/>
+          </a:effectRef>
+          <a:fontRef idx="minor">
+            <a:schemeClr val="tx1"/>
+          </a:fontRef>
+        </p:style>
+      </p:cxnSp>
+      <p:sp>
+        <p:nvSpPr>
+          <p:cNvPr id="25" name="TextBox 24"/>
+          <p:cNvSpPr txBox="1"/>
+          <p:nvPr/>
+        </p:nvSpPr>
+        <p:spPr>
+          <a:xfrm>
+            <a:off x="324222" y="446070"/>
+            <a:ext cx="3536706" cy="369332"/>
+          </a:xfrm>
+          <a:prstGeom prst="rect">
+            <a:avLst/>
+          </a:prstGeom>
+          <a:noFill/>
+        </p:spPr>
+        <p:txBody>
+          <a:bodyPr wrap="square" rtlCol="0">
+            <a:spAutoFit/>
+          </a:bodyPr>
+          <a:lstStyle/>
+          <a:p>
+            <a:pPr algn="ctr"/>
+            <a:r>
+              <a:rPr lang="en-US" dirty="0" err="1" smtClean="0">
+                <a:latin typeface="Courier New"/>
+                <a:cs typeface="Courier New"/>
+              </a:rPr>
+              <a:t>tom_final_DNA_calls.tsv</a:t>
+            </a:r>
+            <a:endParaRPr lang="en-US" dirty="0">
+              <a:latin typeface="Courier New"/>
+              <a:cs typeface="Courier New"/>
+            </a:endParaRPr>
+          </a:p>
+        </p:txBody>
+      </p:sp>
+      <p:sp>
+        <p:nvSpPr>
+          <p:cNvPr id="26" name="TextBox 25"/>
+          <p:cNvSpPr txBox="1"/>
+          <p:nvPr/>
+        </p:nvSpPr>
+        <p:spPr>
+          <a:xfrm>
+            <a:off x="5347625" y="450431"/>
+            <a:ext cx="2551056" cy="369332"/>
+          </a:xfrm>
+          <a:prstGeom prst="rect">
+            <a:avLst/>
+          </a:prstGeom>
+          <a:noFill/>
+        </p:spPr>
+        <p:txBody>
+          <a:bodyPr wrap="square" rtlCol="0">
+            <a:spAutoFit/>
+          </a:bodyPr>
+          <a:lstStyle/>
+          <a:p>
+            <a:pPr algn="ctr"/>
+            <a:r>
+              <a:rPr lang="en-US" dirty="0" err="1" smtClean="0">
+                <a:latin typeface="Courier New"/>
+                <a:cs typeface="Courier New"/>
+              </a:rPr>
+              <a:t>flow_summary.tsv</a:t>
+            </a:r>
+            <a:endParaRPr lang="en-US" dirty="0">
+              <a:latin typeface="Courier New"/>
+              <a:cs typeface="Courier New"/>
+            </a:endParaRPr>
+          </a:p>
+        </p:txBody>
+      </p:sp>
+      <p:cxnSp>
+        <p:nvCxnSpPr>
+          <p:cNvPr id="27" name="Elbow Connector 26"/>
+          <p:cNvCxnSpPr>
+            <a:stCxn id="26" idx="1"/>
+            <a:endCxn id="15" idx="0"/>
+          </p:cNvCxnSpPr>
+          <p:nvPr/>
+        </p:nvCxnSpPr>
+        <p:spPr>
+          <a:xfrm rot="10800000" flipV="1">
+            <a:off x="4883739" y="635097"/>
+            <a:ext cx="463886" cy="1310504"/>
+          </a:xfrm>
+          <a:prstGeom prst="bentConnector2">
+            <a:avLst/>
+          </a:prstGeom>
+        </p:spPr>
+        <p:style>
+          <a:lnRef idx="2">
+            <a:schemeClr val="accent1"/>
+          </a:lnRef>
+          <a:fillRef idx="0">
+            <a:schemeClr val="accent1"/>
+          </a:fillRef>
+          <a:effectRef idx="1">
+            <a:schemeClr val="accent1"/>
+          </a:effectRef>
+          <a:fontRef idx="minor">
+            <a:schemeClr val="tx1"/>
+          </a:fontRef>
+        </p:style>
+      </p:cxnSp>
+      <p:cxnSp>
+        <p:nvCxnSpPr>
+          <p:cNvPr id="31" name="Elbow Connector 30"/>
+          <p:cNvCxnSpPr>
+            <a:stCxn id="25" idx="3"/>
+            <a:endCxn id="15" idx="0"/>
+          </p:cNvCxnSpPr>
+          <p:nvPr/>
+        </p:nvCxnSpPr>
+        <p:spPr>
+          <a:xfrm>
+            <a:off x="3860928" y="630736"/>
+            <a:ext cx="1022811" cy="1314865"/>
+          </a:xfrm>
+          <a:prstGeom prst="bentConnector2">
+            <a:avLst/>
+          </a:prstGeom>
+        </p:spPr>
+        <p:style>
+          <a:lnRef idx="2">
+            <a:schemeClr val="accent1"/>
+          </a:lnRef>
+          <a:fillRef idx="0">
+            <a:schemeClr val="accent1"/>
+          </a:fillRef>
+          <a:effectRef idx="1">
+            <a:schemeClr val="accent1"/>
+          </a:effectRef>
+          <a:fontRef idx="minor">
+            <a:schemeClr val="tx1"/>
+          </a:fontRef>
+        </p:style>
+      </p:cxnSp>
+      <p:sp>
+        <p:nvSpPr>
+          <p:cNvPr id="41" name="TextBox 40"/>
+          <p:cNvSpPr txBox="1"/>
+          <p:nvPr/>
+        </p:nvSpPr>
+        <p:spPr>
+          <a:xfrm>
+            <a:off x="2968723" y="107516"/>
+            <a:ext cx="3830031" cy="338554"/>
+          </a:xfrm>
+          <a:prstGeom prst="rect">
+            <a:avLst/>
+          </a:prstGeom>
+          <a:noFill/>
+        </p:spPr>
+        <p:txBody>
+          <a:bodyPr wrap="square" rtlCol="0">
+            <a:spAutoFit/>
+          </a:bodyPr>
+          <a:lstStyle/>
+          <a:p>
+            <a:pPr algn="ctr"/>
+            <a:r>
+              <a:rPr lang="en-US" sz="1600" dirty="0" err="1" smtClean="0"/>
+              <a:t>gamma_test_output</a:t>
+            </a:r>
+            <a:r>
+              <a:rPr lang="en-US" sz="1600" dirty="0" smtClean="0"/>
+              <a:t>/pASCAT_input_g500/</a:t>
+            </a:r>
+            <a:endParaRPr lang="en-US" sz="1600" dirty="0"/>
+          </a:p>
+        </p:txBody>
+      </p:sp>
+      <p:cxnSp>
+        <p:nvCxnSpPr>
+          <p:cNvPr id="42" name="Elbow Connector 41"/>
+          <p:cNvCxnSpPr>
+            <a:stCxn id="41" idx="2"/>
+            <a:endCxn id="15" idx="0"/>
+          </p:cNvCxnSpPr>
+          <p:nvPr/>
+        </p:nvCxnSpPr>
+        <p:spPr>
+          <a:xfrm rot="5400000">
+            <a:off x="4133974" y="1195835"/>
+            <a:ext cx="1499531" cy="12700"/>
           </a:xfrm>
           <a:prstGeom prst="bentConnector3">
             <a:avLst>

</xml_diff>

<commit_message>
Wide variety of updates: * Powerpoint updated to reflect most recent flow (and new write-up) * Use 'the difference between Xiaohong and pASCAT' as an evidence category for diploid vs. tetraploid * Catch samples where the accuracy is zero because there was no data to check vs. there was no result at all to check. * Find a couple new tetraploid solutions for some samples.  Write new 'getGammaFor' function in lsl for this purpose. * Check odds calculations for data only available to challenge data.
</commit_message>
<xml_diff>
--- a/Python program structure.pptx
+++ b/Python program structure.pptx
@@ -307,7 +307,7 @@
           <a:p>
             <a:fld id="{DCC446B6-7B9C-A04B-98D9-80CC642E8FE6}" type="datetimeFigureOut">
               <a:rPr lang="en-US" smtClean="0"/>
-              <a:t>7/19/18</a:t>
+              <a:t>8/13/18</a:t>
             </a:fld>
             <a:endParaRPr lang="en-US"/>
           </a:p>
@@ -477,7 +477,7 @@
           <a:p>
             <a:fld id="{DCC446B6-7B9C-A04B-98D9-80CC642E8FE6}" type="datetimeFigureOut">
               <a:rPr lang="en-US" smtClean="0"/>
-              <a:t>7/19/18</a:t>
+              <a:t>8/13/18</a:t>
             </a:fld>
             <a:endParaRPr lang="en-US"/>
           </a:p>
@@ -657,7 +657,7 @@
           <a:p>
             <a:fld id="{DCC446B6-7B9C-A04B-98D9-80CC642E8FE6}" type="datetimeFigureOut">
               <a:rPr lang="en-US" smtClean="0"/>
-              <a:t>7/19/18</a:t>
+              <a:t>8/13/18</a:t>
             </a:fld>
             <a:endParaRPr lang="en-US"/>
           </a:p>
@@ -827,7 +827,7 @@
           <a:p>
             <a:fld id="{DCC446B6-7B9C-A04B-98D9-80CC642E8FE6}" type="datetimeFigureOut">
               <a:rPr lang="en-US" smtClean="0"/>
-              <a:t>7/19/18</a:t>
+              <a:t>8/13/18</a:t>
             </a:fld>
             <a:endParaRPr lang="en-US"/>
           </a:p>
@@ -1073,7 +1073,7 @@
           <a:p>
             <a:fld id="{DCC446B6-7B9C-A04B-98D9-80CC642E8FE6}" type="datetimeFigureOut">
               <a:rPr lang="en-US" smtClean="0"/>
-              <a:t>7/19/18</a:t>
+              <a:t>8/13/18</a:t>
             </a:fld>
             <a:endParaRPr lang="en-US"/>
           </a:p>
@@ -1361,7 +1361,7 @@
           <a:p>
             <a:fld id="{DCC446B6-7B9C-A04B-98D9-80CC642E8FE6}" type="datetimeFigureOut">
               <a:rPr lang="en-US" smtClean="0"/>
-              <a:t>7/19/18</a:t>
+              <a:t>8/13/18</a:t>
             </a:fld>
             <a:endParaRPr lang="en-US"/>
           </a:p>
@@ -1783,7 +1783,7 @@
           <a:p>
             <a:fld id="{DCC446B6-7B9C-A04B-98D9-80CC642E8FE6}" type="datetimeFigureOut">
               <a:rPr lang="en-US" smtClean="0"/>
-              <a:t>7/19/18</a:t>
+              <a:t>8/13/18</a:t>
             </a:fld>
             <a:endParaRPr lang="en-US"/>
           </a:p>
@@ -1901,7 +1901,7 @@
           <a:p>
             <a:fld id="{DCC446B6-7B9C-A04B-98D9-80CC642E8FE6}" type="datetimeFigureOut">
               <a:rPr lang="en-US" smtClean="0"/>
-              <a:t>7/19/18</a:t>
+              <a:t>8/13/18</a:t>
             </a:fld>
             <a:endParaRPr lang="en-US"/>
           </a:p>
@@ -1996,7 +1996,7 @@
           <a:p>
             <a:fld id="{DCC446B6-7B9C-A04B-98D9-80CC642E8FE6}" type="datetimeFigureOut">
               <a:rPr lang="en-US" smtClean="0"/>
-              <a:t>7/19/18</a:t>
+              <a:t>8/13/18</a:t>
             </a:fld>
             <a:endParaRPr lang="en-US"/>
           </a:p>
@@ -2273,7 +2273,7 @@
           <a:p>
             <a:fld id="{DCC446B6-7B9C-A04B-98D9-80CC642E8FE6}" type="datetimeFigureOut">
               <a:rPr lang="en-US" smtClean="0"/>
-              <a:t>7/19/18</a:t>
+              <a:t>8/13/18</a:t>
             </a:fld>
             <a:endParaRPr lang="en-US"/>
           </a:p>
@@ -2526,7 +2526,7 @@
           <a:p>
             <a:fld id="{DCC446B6-7B9C-A04B-98D9-80CC642E8FE6}" type="datetimeFigureOut">
               <a:rPr lang="en-US" smtClean="0"/>
-              <a:t>7/19/18</a:t>
+              <a:t>8/13/18</a:t>
             </a:fld>
             <a:endParaRPr lang="en-US"/>
           </a:p>
@@ -2739,7 +2739,7 @@
           <a:p>
             <a:fld id="{DCC446B6-7B9C-A04B-98D9-80CC642E8FE6}" type="datetimeFigureOut">
               <a:rPr lang="en-US" smtClean="0"/>
-              <a:t>7/19/18</a:t>
+              <a:t>8/13/18</a:t>
             </a:fld>
             <a:endParaRPr lang="en-US"/>
           </a:p>
@@ -3367,10 +3367,6 @@
               </a:rPr>
               <a:t>-0_H_SNPlist.txt</a:t>
             </a:r>
-            <a:endParaRPr lang="en-US" dirty="0">
-              <a:latin typeface="Courier New"/>
-              <a:cs typeface="Courier New"/>
-            </a:endParaRPr>
           </a:p>
         </p:txBody>
       </p:sp>
@@ -3410,10 +3406,6 @@
               </a:rPr>
               <a:t>-5-8v1-3_A1.annotated.txt</a:t>
             </a:r>
-            <a:endParaRPr lang="en-US" dirty="0">
-              <a:latin typeface="Courier New"/>
-              <a:cs typeface="Courier New"/>
-            </a:endParaRPr>
           </a:p>
         </p:txBody>
       </p:sp>
@@ -13115,6 +13107,76 @@
           </a:fontRef>
         </p:style>
       </p:cxnSp>
+      <p:sp>
+        <p:nvSpPr>
+          <p:cNvPr id="31" name="TextBox 30"/>
+          <p:cNvSpPr txBox="1"/>
+          <p:nvPr/>
+        </p:nvSpPr>
+        <p:spPr>
+          <a:xfrm>
+            <a:off x="6802942" y="1201460"/>
+            <a:ext cx="2305003" cy="369332"/>
+          </a:xfrm>
+          <a:prstGeom prst="rect">
+            <a:avLst/>
+          </a:prstGeom>
+          <a:noFill/>
+        </p:spPr>
+        <p:txBody>
+          <a:bodyPr wrap="square" rtlCol="0">
+            <a:spAutoFit/>
+          </a:bodyPr>
+          <a:lstStyle/>
+          <a:p>
+            <a:pPr algn="ctr"/>
+            <a:r>
+              <a:rPr lang="en-US" dirty="0" err="1" smtClean="0">
+                <a:latin typeface="Courier New"/>
+                <a:cs typeface="Courier New"/>
+              </a:rPr>
+              <a:t>nan_probes#.txt</a:t>
+            </a:r>
+            <a:endParaRPr lang="en-US" dirty="0">
+              <a:latin typeface="Courier New"/>
+              <a:cs typeface="Courier New"/>
+            </a:endParaRPr>
+          </a:p>
+        </p:txBody>
+      </p:sp>
+      <p:cxnSp>
+        <p:nvCxnSpPr>
+          <p:cNvPr id="41" name="Elbow Connector 40"/>
+          <p:cNvCxnSpPr>
+            <a:stCxn id="31" idx="2"/>
+            <a:endCxn id="60" idx="6"/>
+          </p:cNvCxnSpPr>
+          <p:nvPr/>
+        </p:nvCxnSpPr>
+        <p:spPr>
+          <a:xfrm rot="5400000">
+            <a:off x="7367578" y="1114384"/>
+            <a:ext cx="131458" cy="1044274"/>
+          </a:xfrm>
+          <a:prstGeom prst="bentConnector2">
+            <a:avLst/>
+          </a:prstGeom>
+        </p:spPr>
+        <p:style>
+          <a:lnRef idx="2">
+            <a:schemeClr val="accent1"/>
+          </a:lnRef>
+          <a:fillRef idx="0">
+            <a:schemeClr val="accent1"/>
+          </a:fillRef>
+          <a:effectRef idx="1">
+            <a:schemeClr val="accent1"/>
+          </a:effectRef>
+          <a:fontRef idx="minor">
+            <a:schemeClr val="tx1"/>
+          </a:fontRef>
+        </p:style>
+      </p:cxnSp>
     </p:spTree>
     <p:extLst>
       <p:ext uri="{BB962C8B-B14F-4D97-AF65-F5344CB8AC3E}">
@@ -13588,7 +13650,7 @@
         </p:nvSpPr>
         <p:spPr>
           <a:xfrm>
-            <a:off x="2785957" y="1293215"/>
+            <a:off x="3181672" y="2082207"/>
             <a:ext cx="1695745" cy="369332"/>
           </a:xfrm>
           <a:prstGeom prst="rect">
@@ -13623,7 +13685,7 @@
         </p:nvSpPr>
         <p:spPr>
           <a:xfrm>
-            <a:off x="538951" y="655889"/>
+            <a:off x="538951" y="1097585"/>
             <a:ext cx="3253221" cy="468868"/>
           </a:xfrm>
           <a:prstGeom prst="ellipse">
@@ -13668,8 +13730,8 @@
         </p:nvCxnSpPr>
         <p:spPr>
           <a:xfrm rot="16200000" flipH="1">
-            <a:off x="2815467" y="474852"/>
-            <a:ext cx="168458" cy="1468268"/>
+            <a:off x="2839676" y="892338"/>
+            <a:ext cx="515754" cy="1863983"/>
           </a:xfrm>
           <a:prstGeom prst="bentConnector3">
             <a:avLst>
@@ -13703,7 +13765,7 @@
         </p:nvCxnSpPr>
         <p:spPr>
           <a:xfrm rot="16200000" flipV="1">
-            <a:off x="1641665" y="131991"/>
+            <a:off x="1641665" y="573687"/>
             <a:ext cx="286557" cy="761239"/>
           </a:xfrm>
           <a:prstGeom prst="bentConnector3">
@@ -13808,8 +13870,8 @@
         </p:nvCxnSpPr>
         <p:spPr>
           <a:xfrm rot="5400000">
-            <a:off x="1522141" y="649794"/>
-            <a:ext cx="168458" cy="1118384"/>
+            <a:off x="1546351" y="1462996"/>
+            <a:ext cx="515754" cy="722669"/>
           </a:xfrm>
           <a:prstGeom prst="bentConnector3">
             <a:avLst>
@@ -13873,7 +13935,7 @@
         </p:nvSpPr>
         <p:spPr>
           <a:xfrm>
-            <a:off x="298188" y="0"/>
+            <a:off x="298188" y="441696"/>
             <a:ext cx="2212270" cy="369332"/>
           </a:xfrm>
           <a:prstGeom prst="rect">
@@ -13908,7 +13970,7 @@
         </p:nvSpPr>
         <p:spPr>
           <a:xfrm>
-            <a:off x="60563" y="1293215"/>
+            <a:off x="456278" y="2082207"/>
             <a:ext cx="1973230" cy="369332"/>
           </a:xfrm>
           <a:prstGeom prst="rect">
@@ -14029,9 +14091,9 @@
           <p:nvPr/>
         </p:nvCxnSpPr>
         <p:spPr>
-          <a:xfrm rot="16200000" flipV="1">
-            <a:off x="2255845" y="3040532"/>
-            <a:ext cx="3012972" cy="257002"/>
+          <a:xfrm rot="5400000" flipH="1" flipV="1">
+            <a:off x="2848198" y="3494173"/>
+            <a:ext cx="2223980" cy="138713"/>
           </a:xfrm>
           <a:prstGeom prst="bentConnector3">
             <a:avLst>
@@ -14097,7 +14159,7 @@
         </p:nvSpPr>
         <p:spPr>
           <a:xfrm>
-            <a:off x="4637475" y="824347"/>
+            <a:off x="4637475" y="1266043"/>
             <a:ext cx="3977511" cy="468868"/>
           </a:xfrm>
           <a:prstGeom prst="ellipse">
@@ -14142,7 +14204,7 @@
         </p:nvCxnSpPr>
         <p:spPr>
           <a:xfrm rot="16200000" flipV="1">
-            <a:off x="4248505" y="-1553380"/>
+            <a:off x="4248505" y="-1111684"/>
             <a:ext cx="639681" cy="4115773"/>
           </a:xfrm>
           <a:prstGeom prst="bentConnector2">
@@ -14172,7 +14234,7 @@
         </p:nvSpPr>
         <p:spPr>
           <a:xfrm>
-            <a:off x="5904629" y="2194509"/>
+            <a:off x="5904630" y="2451539"/>
             <a:ext cx="1695745" cy="369332"/>
           </a:xfrm>
           <a:prstGeom prst="rect">
@@ -14210,8 +14272,8 @@
         </p:nvCxnSpPr>
         <p:spPr>
           <a:xfrm rot="16200000" flipV="1">
-            <a:off x="6238720" y="1680726"/>
-            <a:ext cx="901294" cy="126271"/>
+            <a:off x="6331053" y="2030089"/>
+            <a:ext cx="716628" cy="126272"/>
           </a:xfrm>
           <a:prstGeom prst="bentConnector3">
             <a:avLst>
@@ -14287,8 +14349,8 @@
         </p:nvCxnSpPr>
         <p:spPr>
           <a:xfrm rot="5400000" flipH="1" flipV="1">
-            <a:off x="6395867" y="2920475"/>
-            <a:ext cx="713268" cy="1"/>
+            <a:off x="6524383" y="3048989"/>
+            <a:ext cx="456238" cy="2"/>
           </a:xfrm>
           <a:prstGeom prst="bentConnector3">
             <a:avLst>
@@ -14357,8 +14419,8 @@
         </p:nvCxnSpPr>
         <p:spPr>
           <a:xfrm rot="10800000">
-            <a:off x="4481703" y="1477881"/>
-            <a:ext cx="860211" cy="2033662"/>
+            <a:off x="4877417" y="2266873"/>
+            <a:ext cx="464496" cy="1244670"/>
           </a:xfrm>
           <a:prstGeom prst="bentConnector3">
             <a:avLst>
@@ -14427,12 +14489,12 @@
         </p:nvCxnSpPr>
         <p:spPr>
           <a:xfrm rot="16200000" flipV="1">
-            <a:off x="-868234" y="1351089"/>
-            <a:ext cx="4559517" cy="2226671"/>
+            <a:off x="-647386" y="1571937"/>
+            <a:ext cx="4117821" cy="2226671"/>
           </a:xfrm>
           <a:prstGeom prst="bentConnector4">
             <a:avLst>
-              <a:gd name="adj1" fmla="val 5848"/>
+              <a:gd name="adj1" fmla="val 46924"/>
               <a:gd name="adj2" fmla="val 110266"/>
             </a:avLst>
           </a:prstGeom>
@@ -14465,6 +14527,76 @@
           <a:xfrm rot="5400000" flipH="1" flipV="1">
             <a:off x="5852152" y="3717341"/>
             <a:ext cx="431495" cy="1622190"/>
+          </a:xfrm>
+          <a:prstGeom prst="bentConnector3">
+            <a:avLst>
+              <a:gd name="adj1" fmla="val 50000"/>
+            </a:avLst>
+          </a:prstGeom>
+        </p:spPr>
+        <p:style>
+          <a:lnRef idx="2">
+            <a:schemeClr val="accent1"/>
+          </a:lnRef>
+          <a:fillRef idx="0">
+            <a:schemeClr val="accent1"/>
+          </a:fillRef>
+          <a:effectRef idx="1">
+            <a:schemeClr val="accent1"/>
+          </a:effectRef>
+          <a:fontRef idx="minor">
+            <a:schemeClr val="tx1"/>
+          </a:fontRef>
+        </p:style>
+      </p:cxnSp>
+      <p:sp>
+        <p:nvSpPr>
+          <p:cNvPr id="29" name="TextBox 28"/>
+          <p:cNvSpPr txBox="1"/>
+          <p:nvPr/>
+        </p:nvSpPr>
+        <p:spPr>
+          <a:xfrm>
+            <a:off x="1969984" y="72364"/>
+            <a:ext cx="3211118" cy="369332"/>
+          </a:xfrm>
+          <a:prstGeom prst="rect">
+            <a:avLst/>
+          </a:prstGeom>
+          <a:noFill/>
+        </p:spPr>
+        <p:txBody>
+          <a:bodyPr wrap="square" rtlCol="0">
+            <a:spAutoFit/>
+          </a:bodyPr>
+          <a:lstStyle/>
+          <a:p>
+            <a:pPr algn="ctr"/>
+            <a:r>
+              <a:rPr lang="en-US" dirty="0" err="1" smtClean="0"/>
+              <a:t>pASCAT_input_combined_all</a:t>
+            </a:r>
+            <a:r>
+              <a:rPr lang="en-US" dirty="0" smtClean="0"/>
+              <a:t>/</a:t>
+            </a:r>
+            <a:endParaRPr lang="en-US" dirty="0"/>
+          </a:p>
+        </p:txBody>
+      </p:sp>
+      <p:cxnSp>
+        <p:nvCxnSpPr>
+          <p:cNvPr id="30" name="Elbow Connector 29"/>
+          <p:cNvCxnSpPr>
+            <a:stCxn id="3" idx="7"/>
+            <a:endCxn id="29" idx="2"/>
+          </p:cNvCxnSpPr>
+          <p:nvPr/>
+        </p:nvCxnSpPr>
+        <p:spPr>
+          <a:xfrm rot="5400000" flipH="1" flipV="1">
+            <a:off x="3083370" y="674076"/>
+            <a:ext cx="724553" cy="259794"/>
           </a:xfrm>
           <a:prstGeom prst="bentConnector3">
             <a:avLst>
@@ -14962,11 +15094,7 @@
             <a:pPr algn="ctr"/>
             <a:r>
               <a:rPr lang="en-US" sz="1400" dirty="0" err="1" smtClean="0"/>
-              <a:t>count</a:t>
-            </a:r>
-            <a:r>
-              <a:rPr lang="en-US" sz="1400" dirty="0" err="1" smtClean="0"/>
-              <a:t>_ploidy_evidence.py</a:t>
+              <a:t>count_ploidy_evidence.py</a:t>
             </a:r>
             <a:endParaRPr lang="en-US" sz="1400" dirty="0" smtClean="0"/>
           </a:p>
@@ -15288,7 +15416,7 @@
         </p:nvSpPr>
         <p:spPr>
           <a:xfrm>
-            <a:off x="3921589" y="53823"/>
+            <a:off x="3505200" y="0"/>
             <a:ext cx="3348414" cy="369332"/>
           </a:xfrm>
           <a:prstGeom prst="rect">
@@ -15554,13 +15682,16 @@
       <p:cxnSp>
         <p:nvCxnSpPr>
           <p:cNvPr id="32" name="Elbow Connector 31"/>
-          <p:cNvCxnSpPr/>
+          <p:cNvCxnSpPr>
+            <a:stCxn id="2" idx="2"/>
+            <a:endCxn id="20" idx="0"/>
+          </p:cNvCxnSpPr>
           <p:nvPr/>
         </p:nvCxnSpPr>
         <p:spPr>
           <a:xfrm rot="16200000" flipH="1">
-            <a:off x="6269594" y="-259918"/>
-            <a:ext cx="308061" cy="1674207"/>
+            <a:off x="6043763" y="-495024"/>
+            <a:ext cx="361884" cy="2090596"/>
           </a:xfrm>
           <a:prstGeom prst="bentConnector3">
             <a:avLst>
@@ -16244,8 +16375,8 @@
         </p:nvCxnSpPr>
         <p:spPr>
           <a:xfrm rot="5400000">
-            <a:off x="3217770" y="-870825"/>
-            <a:ext cx="1084047" cy="3672006"/>
+            <a:off x="2982664" y="-689541"/>
+            <a:ext cx="1137870" cy="3255617"/>
           </a:xfrm>
           <a:prstGeom prst="bentConnector3">
             <a:avLst>
@@ -16318,6 +16449,76 @@
           <a:xfrm rot="5400000">
             <a:off x="1474553" y="984094"/>
             <a:ext cx="972345" cy="73870"/>
+          </a:xfrm>
+          <a:prstGeom prst="bentConnector3">
+            <a:avLst>
+              <a:gd name="adj1" fmla="val 50000"/>
+            </a:avLst>
+          </a:prstGeom>
+        </p:spPr>
+        <p:style>
+          <a:lnRef idx="2">
+            <a:schemeClr val="accent1"/>
+          </a:lnRef>
+          <a:fillRef idx="0">
+            <a:schemeClr val="accent1"/>
+          </a:fillRef>
+          <a:effectRef idx="1">
+            <a:schemeClr val="accent1"/>
+          </a:effectRef>
+          <a:fontRef idx="minor">
+            <a:schemeClr val="tx1"/>
+          </a:fontRef>
+        </p:style>
+      </p:cxnSp>
+      <p:sp>
+        <p:nvSpPr>
+          <p:cNvPr id="30" name="TextBox 29"/>
+          <p:cNvSpPr txBox="1"/>
+          <p:nvPr/>
+        </p:nvSpPr>
+        <p:spPr>
+          <a:xfrm>
+            <a:off x="6754758" y="119363"/>
+            <a:ext cx="2380066" cy="369332"/>
+          </a:xfrm>
+          <a:prstGeom prst="rect">
+            <a:avLst/>
+          </a:prstGeom>
+          <a:noFill/>
+        </p:spPr>
+        <p:txBody>
+          <a:bodyPr wrap="square" rtlCol="0">
+            <a:spAutoFit/>
+          </a:bodyPr>
+          <a:lstStyle/>
+          <a:p>
+            <a:pPr algn="ctr"/>
+            <a:r>
+              <a:rPr lang="en-US" dirty="0" err="1" smtClean="0"/>
+              <a:t>BAF_filtered_data</a:t>
+            </a:r>
+            <a:r>
+              <a:rPr lang="en-US" dirty="0" smtClean="0"/>
+              <a:t>_*/</a:t>
+            </a:r>
+            <a:endParaRPr lang="en-US" dirty="0"/>
+          </a:p>
+        </p:txBody>
+      </p:sp>
+      <p:cxnSp>
+        <p:nvCxnSpPr>
+          <p:cNvPr id="33" name="Elbow Connector 32"/>
+          <p:cNvCxnSpPr>
+            <a:stCxn id="30" idx="2"/>
+            <a:endCxn id="20" idx="0"/>
+          </p:cNvCxnSpPr>
+          <p:nvPr/>
+        </p:nvCxnSpPr>
+        <p:spPr>
+          <a:xfrm rot="5400000">
+            <a:off x="7486137" y="272561"/>
+            <a:ext cx="242521" cy="674788"/>
           </a:xfrm>
           <a:prstGeom prst="bentConnector3">
             <a:avLst>

</xml_diff>

<commit_message>
Investigate matching ratios; other general updates.
</commit_message>
<xml_diff>
--- a/Python program structure.pptx
+++ b/Python program structure.pptx
@@ -307,7 +307,7 @@
           <a:p>
             <a:fld id="{DCC446B6-7B9C-A04B-98D9-80CC642E8FE6}" type="datetimeFigureOut">
               <a:rPr lang="en-US" smtClean="0"/>
-              <a:t>8/13/18</a:t>
+              <a:t>9/14/18</a:t>
             </a:fld>
             <a:endParaRPr lang="en-US"/>
           </a:p>
@@ -477,7 +477,7 @@
           <a:p>
             <a:fld id="{DCC446B6-7B9C-A04B-98D9-80CC642E8FE6}" type="datetimeFigureOut">
               <a:rPr lang="en-US" smtClean="0"/>
-              <a:t>8/13/18</a:t>
+              <a:t>9/14/18</a:t>
             </a:fld>
             <a:endParaRPr lang="en-US"/>
           </a:p>
@@ -657,7 +657,7 @@
           <a:p>
             <a:fld id="{DCC446B6-7B9C-A04B-98D9-80CC642E8FE6}" type="datetimeFigureOut">
               <a:rPr lang="en-US" smtClean="0"/>
-              <a:t>8/13/18</a:t>
+              <a:t>9/14/18</a:t>
             </a:fld>
             <a:endParaRPr lang="en-US"/>
           </a:p>
@@ -827,7 +827,7 @@
           <a:p>
             <a:fld id="{DCC446B6-7B9C-A04B-98D9-80CC642E8FE6}" type="datetimeFigureOut">
               <a:rPr lang="en-US" smtClean="0"/>
-              <a:t>8/13/18</a:t>
+              <a:t>9/14/18</a:t>
             </a:fld>
             <a:endParaRPr lang="en-US"/>
           </a:p>
@@ -1073,7 +1073,7 @@
           <a:p>
             <a:fld id="{DCC446B6-7B9C-A04B-98D9-80CC642E8FE6}" type="datetimeFigureOut">
               <a:rPr lang="en-US" smtClean="0"/>
-              <a:t>8/13/18</a:t>
+              <a:t>9/14/18</a:t>
             </a:fld>
             <a:endParaRPr lang="en-US"/>
           </a:p>
@@ -1361,7 +1361,7 @@
           <a:p>
             <a:fld id="{DCC446B6-7B9C-A04B-98D9-80CC642E8FE6}" type="datetimeFigureOut">
               <a:rPr lang="en-US" smtClean="0"/>
-              <a:t>8/13/18</a:t>
+              <a:t>9/14/18</a:t>
             </a:fld>
             <a:endParaRPr lang="en-US"/>
           </a:p>
@@ -1783,7 +1783,7 @@
           <a:p>
             <a:fld id="{DCC446B6-7B9C-A04B-98D9-80CC642E8FE6}" type="datetimeFigureOut">
               <a:rPr lang="en-US" smtClean="0"/>
-              <a:t>8/13/18</a:t>
+              <a:t>9/14/18</a:t>
             </a:fld>
             <a:endParaRPr lang="en-US"/>
           </a:p>
@@ -1901,7 +1901,7 @@
           <a:p>
             <a:fld id="{DCC446B6-7B9C-A04B-98D9-80CC642E8FE6}" type="datetimeFigureOut">
               <a:rPr lang="en-US" smtClean="0"/>
-              <a:t>8/13/18</a:t>
+              <a:t>9/14/18</a:t>
             </a:fld>
             <a:endParaRPr lang="en-US"/>
           </a:p>
@@ -1996,7 +1996,7 @@
           <a:p>
             <a:fld id="{DCC446B6-7B9C-A04B-98D9-80CC642E8FE6}" type="datetimeFigureOut">
               <a:rPr lang="en-US" smtClean="0"/>
-              <a:t>8/13/18</a:t>
+              <a:t>9/14/18</a:t>
             </a:fld>
             <a:endParaRPr lang="en-US"/>
           </a:p>
@@ -2273,7 +2273,7 @@
           <a:p>
             <a:fld id="{DCC446B6-7B9C-A04B-98D9-80CC642E8FE6}" type="datetimeFigureOut">
               <a:rPr lang="en-US" smtClean="0"/>
-              <a:t>8/13/18</a:t>
+              <a:t>9/14/18</a:t>
             </a:fld>
             <a:endParaRPr lang="en-US"/>
           </a:p>
@@ -2526,7 +2526,7 @@
           <a:p>
             <a:fld id="{DCC446B6-7B9C-A04B-98D9-80CC642E8FE6}" type="datetimeFigureOut">
               <a:rPr lang="en-US" smtClean="0"/>
-              <a:t>8/13/18</a:t>
+              <a:t>9/14/18</a:t>
             </a:fld>
             <a:endParaRPr lang="en-US"/>
           </a:p>
@@ -2739,7 +2739,7 @@
           <a:p>
             <a:fld id="{DCC446B6-7B9C-A04B-98D9-80CC642E8FE6}" type="datetimeFigureOut">
               <a:rPr lang="en-US" smtClean="0"/>
-              <a:t>8/13/18</a:t>
+              <a:t>9/14/18</a:t>
             </a:fld>
             <a:endParaRPr lang="en-US"/>
           </a:p>
@@ -12833,8 +12833,8 @@
         </p:nvSpPr>
         <p:spPr>
           <a:xfrm>
-            <a:off x="1872700" y="5340595"/>
-            <a:ext cx="3185227" cy="468868"/>
+            <a:off x="1426414" y="5340595"/>
+            <a:ext cx="3631514" cy="468868"/>
           </a:xfrm>
           <a:prstGeom prst="ellipse">
             <a:avLst/>
@@ -12861,7 +12861,7 @@
             <a:pPr algn="ctr"/>
             <a:r>
               <a:rPr lang="en-US" sz="1400" dirty="0" err="1" smtClean="0"/>
-              <a:t>make_pASCAT_sge_files.py</a:t>
+              <a:t>make_gamma_test_sge_files.py</a:t>
             </a:r>
             <a:endParaRPr lang="en-US" sz="1400" dirty="0" smtClean="0"/>
           </a:p>
@@ -12878,8 +12878,8 @@
         </p:nvCxnSpPr>
         <p:spPr>
           <a:xfrm rot="5400000" flipH="1" flipV="1">
-            <a:off x="4379151" y="4201160"/>
-            <a:ext cx="225599" cy="2053272"/>
+            <a:off x="4267579" y="4089589"/>
+            <a:ext cx="225599" cy="2276415"/>
           </a:xfrm>
           <a:prstGeom prst="bentConnector3">
             <a:avLst>
@@ -13047,13 +13047,13 @@
         </p:nvCxnSpPr>
         <p:spPr>
           <a:xfrm rot="5400000" flipH="1" flipV="1">
-            <a:off x="4220602" y="4819739"/>
-            <a:ext cx="234435" cy="1745013"/>
+            <a:off x="4109031" y="4708168"/>
+            <a:ext cx="234435" cy="1968156"/>
           </a:xfrm>
           <a:prstGeom prst="bentConnector4">
             <a:avLst>
               <a:gd name="adj1" fmla="val -97511"/>
-              <a:gd name="adj2" fmla="val 95633"/>
+              <a:gd name="adj2" fmla="val 96128"/>
             </a:avLst>
           </a:prstGeom>
         </p:spPr>

</xml_diff>

<commit_message>
Update to latest versions.
</commit_message>
<xml_diff>
--- a/Python program structure.pptx
+++ b/Python program structure.pptx
@@ -127,7 +127,7 @@
   </p:defaultTextStyle>
   <p:extLst>
     <p:ext uri="{EFAFB233-063F-42B5-8137-9DF3F51BA10A}">
-      <p15:sldGuideLst xmlns:p15="http://schemas.microsoft.com/office/powerpoint/2012/main">
+      <p15:sldGuideLst xmlns:p15="http://schemas.microsoft.com/office/powerpoint/2012/main" xmlns="">
         <p15:guide id="1" orient="horz" pos="2160">
           <p15:clr>
             <a:srgbClr val="A4A3A4"/>
@@ -323,7 +323,7 @@
           <a:p>
             <a:fld id="{DCC446B6-7B9C-A04B-98D9-80CC642E8FE6}" type="datetimeFigureOut">
               <a:rPr lang="en-US" smtClean="0"/>
-              <a:t>9/30/2019</a:t>
+              <a:t>10/28/19</a:t>
             </a:fld>
             <a:endParaRPr lang="en-US"/>
           </a:p>
@@ -491,7 +491,7 @@
           <a:p>
             <a:fld id="{DCC446B6-7B9C-A04B-98D9-80CC642E8FE6}" type="datetimeFigureOut">
               <a:rPr lang="en-US" smtClean="0"/>
-              <a:t>9/30/2019</a:t>
+              <a:t>10/28/19</a:t>
             </a:fld>
             <a:endParaRPr lang="en-US"/>
           </a:p>
@@ -669,7 +669,7 @@
           <a:p>
             <a:fld id="{DCC446B6-7B9C-A04B-98D9-80CC642E8FE6}" type="datetimeFigureOut">
               <a:rPr lang="en-US" smtClean="0"/>
-              <a:t>9/30/2019</a:t>
+              <a:t>10/28/19</a:t>
             </a:fld>
             <a:endParaRPr lang="en-US"/>
           </a:p>
@@ -837,7 +837,7 @@
           <a:p>
             <a:fld id="{DCC446B6-7B9C-A04B-98D9-80CC642E8FE6}" type="datetimeFigureOut">
               <a:rPr lang="en-US" smtClean="0"/>
-              <a:t>9/30/2019</a:t>
+              <a:t>10/28/19</a:t>
             </a:fld>
             <a:endParaRPr lang="en-US"/>
           </a:p>
@@ -1082,7 +1082,7 @@
           <a:p>
             <a:fld id="{DCC446B6-7B9C-A04B-98D9-80CC642E8FE6}" type="datetimeFigureOut">
               <a:rPr lang="en-US" smtClean="0"/>
-              <a:t>9/30/2019</a:t>
+              <a:t>10/28/19</a:t>
             </a:fld>
             <a:endParaRPr lang="en-US"/>
           </a:p>
@@ -1367,7 +1367,7 @@
           <a:p>
             <a:fld id="{DCC446B6-7B9C-A04B-98D9-80CC642E8FE6}" type="datetimeFigureOut">
               <a:rPr lang="en-US" smtClean="0"/>
-              <a:t>9/30/2019</a:t>
+              <a:t>10/28/19</a:t>
             </a:fld>
             <a:endParaRPr lang="en-US"/>
           </a:p>
@@ -1786,7 +1786,7 @@
           <a:p>
             <a:fld id="{DCC446B6-7B9C-A04B-98D9-80CC642E8FE6}" type="datetimeFigureOut">
               <a:rPr lang="en-US" smtClean="0"/>
-              <a:t>9/30/2019</a:t>
+              <a:t>10/28/19</a:t>
             </a:fld>
             <a:endParaRPr lang="en-US"/>
           </a:p>
@@ -1903,7 +1903,7 @@
           <a:p>
             <a:fld id="{DCC446B6-7B9C-A04B-98D9-80CC642E8FE6}" type="datetimeFigureOut">
               <a:rPr lang="en-US" smtClean="0"/>
-              <a:t>9/30/2019</a:t>
+              <a:t>10/28/19</a:t>
             </a:fld>
             <a:endParaRPr lang="en-US"/>
           </a:p>
@@ -1998,7 +1998,7 @@
           <a:p>
             <a:fld id="{DCC446B6-7B9C-A04B-98D9-80CC642E8FE6}" type="datetimeFigureOut">
               <a:rPr lang="en-US" smtClean="0"/>
-              <a:t>9/30/2019</a:t>
+              <a:t>10/28/19</a:t>
             </a:fld>
             <a:endParaRPr lang="en-US"/>
           </a:p>
@@ -2273,7 +2273,7 @@
           <a:p>
             <a:fld id="{DCC446B6-7B9C-A04B-98D9-80CC642E8FE6}" type="datetimeFigureOut">
               <a:rPr lang="en-US" smtClean="0"/>
-              <a:t>9/30/2019</a:t>
+              <a:t>10/28/19</a:t>
             </a:fld>
             <a:endParaRPr lang="en-US"/>
           </a:p>
@@ -2525,7 +2525,7 @@
           <a:p>
             <a:fld id="{DCC446B6-7B9C-A04B-98D9-80CC642E8FE6}" type="datetimeFigureOut">
               <a:rPr lang="en-US" smtClean="0"/>
-              <a:t>9/30/2019</a:t>
+              <a:t>10/28/19</a:t>
             </a:fld>
             <a:endParaRPr lang="en-US"/>
           </a:p>
@@ -2736,7 +2736,7 @@
           <a:p>
             <a:fld id="{DCC446B6-7B9C-A04B-98D9-80CC642E8FE6}" type="datetimeFigureOut">
               <a:rPr lang="en-US" smtClean="0"/>
-              <a:t>9/30/2019</a:t>
+              <a:t>10/28/19</a:t>
             </a:fld>
             <a:endParaRPr lang="en-US"/>
           </a:p>
@@ -18152,7 +18152,7 @@
           <p:cNvPr id="2" name="TextBox 1">
             <a:extLst>
               <a:ext uri="{FF2B5EF4-FFF2-40B4-BE49-F238E27FC236}">
-                <a16:creationId xmlns:a16="http://schemas.microsoft.com/office/drawing/2014/main" id="{841913E6-0560-4C6A-8ED8-BECCD536F1E3}"/>
+                <a16:creationId xmlns:a16="http://schemas.microsoft.com/office/drawing/2014/main" xmlns="" id="{841913E6-0560-4C6A-8ED8-BECCD536F1E3}"/>
               </a:ext>
             </a:extLst>
           </p:cNvPr>
@@ -18192,7 +18192,7 @@
           <p:cNvPr id="4" name="Oval 3">
             <a:extLst>
               <a:ext uri="{FF2B5EF4-FFF2-40B4-BE49-F238E27FC236}">
-                <a16:creationId xmlns:a16="http://schemas.microsoft.com/office/drawing/2014/main" id="{D977AB42-A668-4442-B7B3-035F51736FF7}"/>
+                <a16:creationId xmlns:a16="http://schemas.microsoft.com/office/drawing/2014/main" xmlns="" id="{D977AB42-A668-4442-B7B3-035F51736FF7}"/>
               </a:ext>
             </a:extLst>
           </p:cNvPr>
@@ -18239,7 +18239,7 @@
           <p:cNvPr id="8" name="Elbow Connector 47">
             <a:extLst>
               <a:ext uri="{FF2B5EF4-FFF2-40B4-BE49-F238E27FC236}">
-                <a16:creationId xmlns:a16="http://schemas.microsoft.com/office/drawing/2014/main" id="{9FFE1939-21BE-4ED7-AF80-94D4924D0B52}"/>
+                <a16:creationId xmlns:a16="http://schemas.microsoft.com/office/drawing/2014/main" xmlns="" id="{9FFE1939-21BE-4ED7-AF80-94D4924D0B52}"/>
               </a:ext>
             </a:extLst>
           </p:cNvPr>
@@ -18281,7 +18281,7 @@
           <p:cNvPr id="13" name="Oval 12">
             <a:extLst>
               <a:ext uri="{FF2B5EF4-FFF2-40B4-BE49-F238E27FC236}">
-                <a16:creationId xmlns:a16="http://schemas.microsoft.com/office/drawing/2014/main" id="{A07BAD29-E669-4E17-A860-314539CA9C9E}"/>
+                <a16:creationId xmlns:a16="http://schemas.microsoft.com/office/drawing/2014/main" xmlns="" id="{A07BAD29-E669-4E17-A860-314539CA9C9E}"/>
               </a:ext>
             </a:extLst>
           </p:cNvPr>
@@ -18328,7 +18328,7 @@
           <p:cNvPr id="15" name="Elbow Connector 18">
             <a:extLst>
               <a:ext uri="{FF2B5EF4-FFF2-40B4-BE49-F238E27FC236}">
-                <a16:creationId xmlns:a16="http://schemas.microsoft.com/office/drawing/2014/main" id="{7532C528-E83D-4436-A563-CCAF55CC2993}"/>
+                <a16:creationId xmlns:a16="http://schemas.microsoft.com/office/drawing/2014/main" xmlns="" id="{7532C528-E83D-4436-A563-CCAF55CC2993}"/>
               </a:ext>
             </a:extLst>
           </p:cNvPr>
@@ -18370,7 +18370,7 @@
           <p:cNvPr id="16" name="TextBox 15">
             <a:extLst>
               <a:ext uri="{FF2B5EF4-FFF2-40B4-BE49-F238E27FC236}">
-                <a16:creationId xmlns:a16="http://schemas.microsoft.com/office/drawing/2014/main" id="{221BA4DF-20BA-48FE-A58A-6AEDA18B6DC3}"/>
+                <a16:creationId xmlns:a16="http://schemas.microsoft.com/office/drawing/2014/main" xmlns="" id="{221BA4DF-20BA-48FE-A58A-6AEDA18B6DC3}"/>
               </a:ext>
             </a:extLst>
           </p:cNvPr>
@@ -18409,7 +18409,7 @@
           <p:cNvPr id="19" name="Elbow Connector 30">
             <a:extLst>
               <a:ext uri="{FF2B5EF4-FFF2-40B4-BE49-F238E27FC236}">
-                <a16:creationId xmlns:a16="http://schemas.microsoft.com/office/drawing/2014/main" id="{28744C4D-767A-49FE-8841-CF64DE7CF290}"/>
+                <a16:creationId xmlns:a16="http://schemas.microsoft.com/office/drawing/2014/main" xmlns="" id="{28744C4D-767A-49FE-8841-CF64DE7CF290}"/>
               </a:ext>
             </a:extLst>
           </p:cNvPr>
@@ -18451,7 +18451,7 @@
           <p:cNvPr id="20" name="TextBox 19">
             <a:extLst>
               <a:ext uri="{FF2B5EF4-FFF2-40B4-BE49-F238E27FC236}">
-                <a16:creationId xmlns:a16="http://schemas.microsoft.com/office/drawing/2014/main" id="{E8BD1F53-AEB1-424F-8911-A488E9589575}"/>
+                <a16:creationId xmlns:a16="http://schemas.microsoft.com/office/drawing/2014/main" xmlns="" id="{E8BD1F53-AEB1-424F-8911-A488E9589575}"/>
               </a:ext>
             </a:extLst>
           </p:cNvPr>
@@ -18491,7 +18491,7 @@
           <p:cNvPr id="21" name="Elbow Connector 41">
             <a:extLst>
               <a:ext uri="{FF2B5EF4-FFF2-40B4-BE49-F238E27FC236}">
-                <a16:creationId xmlns:a16="http://schemas.microsoft.com/office/drawing/2014/main" id="{0E03B66C-B43C-4E63-8E6F-A2CD5B1957ED}"/>
+                <a16:creationId xmlns:a16="http://schemas.microsoft.com/office/drawing/2014/main" xmlns="" id="{0E03B66C-B43C-4E63-8E6F-A2CD5B1957ED}"/>
               </a:ext>
             </a:extLst>
           </p:cNvPr>
@@ -18533,7 +18533,7 @@
           <p:cNvPr id="61" name="TextBox 60">
             <a:extLst>
               <a:ext uri="{FF2B5EF4-FFF2-40B4-BE49-F238E27FC236}">
-                <a16:creationId xmlns:a16="http://schemas.microsoft.com/office/drawing/2014/main" id="{3A2EBB58-A883-45A4-93CA-D35E4C2CA86D}"/>
+                <a16:creationId xmlns:a16="http://schemas.microsoft.com/office/drawing/2014/main" xmlns="" id="{3A2EBB58-A883-45A4-93CA-D35E4C2CA86D}"/>
               </a:ext>
             </a:extLst>
           </p:cNvPr>
@@ -18573,7 +18573,7 @@
           <p:cNvPr id="62" name="Oval 61">
             <a:extLst>
               <a:ext uri="{FF2B5EF4-FFF2-40B4-BE49-F238E27FC236}">
-                <a16:creationId xmlns:a16="http://schemas.microsoft.com/office/drawing/2014/main" id="{8707D029-2347-40D7-AB1B-5C05AA7618F5}"/>
+                <a16:creationId xmlns:a16="http://schemas.microsoft.com/office/drawing/2014/main" xmlns="" id="{8707D029-2347-40D7-AB1B-5C05AA7618F5}"/>
               </a:ext>
             </a:extLst>
           </p:cNvPr>
@@ -18609,9 +18609,14 @@
           <a:p>
             <a:pPr algn="ctr"/>
             <a:r>
-              <a:rPr lang="en-US" sz="1400" dirty="0"/>
-              <a:t>Find_SNP_groups.py</a:t>
-            </a:r>
+              <a:rPr lang="en-US" sz="1400" dirty="0" err="1"/>
+              <a:t>f</a:t>
+            </a:r>
+            <a:r>
+              <a:rPr lang="en-US" sz="1400" dirty="0" err="1" smtClean="0"/>
+              <a:t>ind_SNP_groups.py</a:t>
+            </a:r>
+            <a:endParaRPr lang="en-US" sz="1400" dirty="0"/>
           </a:p>
         </p:txBody>
       </p:sp>
@@ -18620,7 +18625,7 @@
           <p:cNvPr id="63" name="Elbow Connector 18">
             <a:extLst>
               <a:ext uri="{FF2B5EF4-FFF2-40B4-BE49-F238E27FC236}">
-                <a16:creationId xmlns:a16="http://schemas.microsoft.com/office/drawing/2014/main" id="{605BDC00-E715-4E06-A284-20EC83D5032F}"/>
+                <a16:creationId xmlns:a16="http://schemas.microsoft.com/office/drawing/2014/main" xmlns="" id="{605BDC00-E715-4E06-A284-20EC83D5032F}"/>
               </a:ext>
             </a:extLst>
           </p:cNvPr>
@@ -18662,7 +18667,7 @@
           <p:cNvPr id="64" name="Elbow Connector 41">
             <a:extLst>
               <a:ext uri="{FF2B5EF4-FFF2-40B4-BE49-F238E27FC236}">
-                <a16:creationId xmlns:a16="http://schemas.microsoft.com/office/drawing/2014/main" id="{019AD323-762E-419B-865F-D562CA045EAA}"/>
+                <a16:creationId xmlns:a16="http://schemas.microsoft.com/office/drawing/2014/main" xmlns="" id="{019AD323-762E-419B-865F-D562CA045EAA}"/>
               </a:ext>
             </a:extLst>
           </p:cNvPr>
@@ -18677,6 +18682,568 @@
           <a:xfrm rot="5400000">
             <a:off x="3147108" y="544315"/>
             <a:ext cx="89913" cy="2410964"/>
+          </a:xfrm>
+          <a:prstGeom prst="bentConnector3">
+            <a:avLst>
+              <a:gd name="adj1" fmla="val 50000"/>
+            </a:avLst>
+          </a:prstGeom>
+        </p:spPr>
+        <p:style>
+          <a:lnRef idx="2">
+            <a:schemeClr val="accent1"/>
+          </a:lnRef>
+          <a:fillRef idx="0">
+            <a:schemeClr val="accent1"/>
+          </a:fillRef>
+          <a:effectRef idx="1">
+            <a:schemeClr val="accent1"/>
+          </a:effectRef>
+          <a:fontRef idx="minor">
+            <a:schemeClr val="tx1"/>
+          </a:fontRef>
+        </p:style>
+      </p:cxnSp>
+      <p:sp>
+        <p:nvSpPr>
+          <p:cNvPr id="17" name="TextBox 16">
+            <a:extLst>
+              <a:ext uri="{FF2B5EF4-FFF2-40B4-BE49-F238E27FC236}">
+                <a16:creationId xmlns:a16="http://schemas.microsoft.com/office/drawing/2014/main" xmlns="" id="{841913E6-0560-4C6A-8ED8-BECCD536F1E3}"/>
+              </a:ext>
+            </a:extLst>
+          </p:cNvPr>
+          <p:cNvSpPr txBox="1"/>
+          <p:nvPr/>
+        </p:nvSpPr>
+        <p:spPr>
+          <a:xfrm>
+            <a:off x="5573080" y="6106907"/>
+            <a:ext cx="2382294" cy="338554"/>
+          </a:xfrm>
+          <a:prstGeom prst="rect">
+            <a:avLst/>
+          </a:prstGeom>
+          <a:noFill/>
+        </p:spPr>
+        <p:txBody>
+          <a:bodyPr wrap="square" rtlCol="0">
+            <a:spAutoFit/>
+          </a:bodyPr>
+          <a:lstStyle/>
+          <a:p>
+            <a:pPr algn="ctr"/>
+            <a:r>
+              <a:rPr lang="en-US" sz="1600" dirty="0" err="1"/>
+              <a:t>VAFclusters_pngs</a:t>
+            </a:r>
+            <a:r>
+              <a:rPr lang="en-US" sz="1600" dirty="0"/>
+              <a:t>/</a:t>
+            </a:r>
+          </a:p>
+        </p:txBody>
+      </p:sp>
+      <p:sp>
+        <p:nvSpPr>
+          <p:cNvPr id="18" name="Oval 17">
+            <a:extLst>
+              <a:ext uri="{FF2B5EF4-FFF2-40B4-BE49-F238E27FC236}">
+                <a16:creationId xmlns:a16="http://schemas.microsoft.com/office/drawing/2014/main" xmlns="" id="{D977AB42-A668-4442-B7B3-035F51736FF7}"/>
+              </a:ext>
+            </a:extLst>
+          </p:cNvPr>
+          <p:cNvSpPr/>
+          <p:nvPr/>
+        </p:nvSpPr>
+        <p:spPr>
+          <a:xfrm>
+            <a:off x="2810531" y="4280448"/>
+            <a:ext cx="3478829" cy="468868"/>
+          </a:xfrm>
+          <a:prstGeom prst="ellipse">
+            <a:avLst/>
+          </a:prstGeom>
+        </p:spPr>
+        <p:style>
+          <a:lnRef idx="1">
+            <a:schemeClr val="accent1"/>
+          </a:lnRef>
+          <a:fillRef idx="3">
+            <a:schemeClr val="accent1"/>
+          </a:fillRef>
+          <a:effectRef idx="2">
+            <a:schemeClr val="accent1"/>
+          </a:effectRef>
+          <a:fontRef idx="minor">
+            <a:schemeClr val="lt1"/>
+          </a:fontRef>
+        </p:style>
+        <p:txBody>
+          <a:bodyPr rtlCol="0" anchor="ctr"/>
+          <a:lstStyle/>
+          <a:p>
+            <a:pPr algn="ctr"/>
+            <a:r>
+              <a:rPr lang="en-US" sz="1400" dirty="0"/>
+              <a:t>cluster_VAFs.py</a:t>
+            </a:r>
+          </a:p>
+        </p:txBody>
+      </p:sp>
+      <p:cxnSp>
+        <p:nvCxnSpPr>
+          <p:cNvPr id="22" name="Elbow Connector 47">
+            <a:extLst>
+              <a:ext uri="{FF2B5EF4-FFF2-40B4-BE49-F238E27FC236}">
+                <a16:creationId xmlns:a16="http://schemas.microsoft.com/office/drawing/2014/main" xmlns="" id="{9FFE1939-21BE-4ED7-AF80-94D4924D0B52}"/>
+              </a:ext>
+            </a:extLst>
+          </p:cNvPr>
+          <p:cNvCxnSpPr>
+            <a:cxnSpLocks/>
+            <a:stCxn id="18" idx="4"/>
+            <a:endCxn id="27" idx="0"/>
+          </p:cNvCxnSpPr>
+          <p:nvPr/>
+        </p:nvCxnSpPr>
+        <p:spPr>
+          <a:xfrm rot="5400000">
+            <a:off x="4386114" y="4836948"/>
+            <a:ext cx="251465" cy="76200"/>
+          </a:xfrm>
+          <a:prstGeom prst="bentConnector3">
+            <a:avLst>
+              <a:gd name="adj1" fmla="val 50000"/>
+            </a:avLst>
+          </a:prstGeom>
+        </p:spPr>
+        <p:style>
+          <a:lnRef idx="2">
+            <a:schemeClr val="accent1"/>
+          </a:lnRef>
+          <a:fillRef idx="0">
+            <a:schemeClr val="accent1"/>
+          </a:fillRef>
+          <a:effectRef idx="1">
+            <a:schemeClr val="accent1"/>
+          </a:effectRef>
+          <a:fontRef idx="minor">
+            <a:schemeClr val="tx1"/>
+          </a:fontRef>
+        </p:style>
+      </p:cxnSp>
+      <p:sp>
+        <p:nvSpPr>
+          <p:cNvPr id="23" name="Oval 22">
+            <a:extLst>
+              <a:ext uri="{FF2B5EF4-FFF2-40B4-BE49-F238E27FC236}">
+                <a16:creationId xmlns:a16="http://schemas.microsoft.com/office/drawing/2014/main" xmlns="" id="{A07BAD29-E669-4E17-A860-314539CA9C9E}"/>
+              </a:ext>
+            </a:extLst>
+          </p:cNvPr>
+          <p:cNvSpPr/>
+          <p:nvPr/>
+        </p:nvSpPr>
+        <p:spPr>
+          <a:xfrm>
+            <a:off x="4724400" y="5429248"/>
+            <a:ext cx="3478829" cy="468868"/>
+          </a:xfrm>
+          <a:prstGeom prst="ellipse">
+            <a:avLst/>
+          </a:prstGeom>
+        </p:spPr>
+        <p:style>
+          <a:lnRef idx="1">
+            <a:schemeClr val="accent1"/>
+          </a:lnRef>
+          <a:fillRef idx="3">
+            <a:schemeClr val="accent1"/>
+          </a:fillRef>
+          <a:effectRef idx="2">
+            <a:schemeClr val="accent1"/>
+          </a:effectRef>
+          <a:fontRef idx="minor">
+            <a:schemeClr val="lt1"/>
+          </a:fontRef>
+        </p:style>
+        <p:txBody>
+          <a:bodyPr rtlCol="0" anchor="ctr"/>
+          <a:lstStyle/>
+          <a:p>
+            <a:pPr algn="ctr"/>
+            <a:r>
+              <a:rPr lang="en-US" sz="1400" dirty="0"/>
+              <a:t>viewVAFclusters.py</a:t>
+            </a:r>
+          </a:p>
+        </p:txBody>
+      </p:sp>
+      <p:cxnSp>
+        <p:nvCxnSpPr>
+          <p:cNvPr id="24" name="Elbow Connector 18">
+            <a:extLst>
+              <a:ext uri="{FF2B5EF4-FFF2-40B4-BE49-F238E27FC236}">
+                <a16:creationId xmlns:a16="http://schemas.microsoft.com/office/drawing/2014/main" xmlns="" id="{7532C528-E83D-4436-A563-CCAF55CC2993}"/>
+              </a:ext>
+            </a:extLst>
+          </p:cNvPr>
+          <p:cNvCxnSpPr>
+            <a:cxnSpLocks/>
+            <a:stCxn id="23" idx="4"/>
+            <a:endCxn id="17" idx="0"/>
+          </p:cNvCxnSpPr>
+          <p:nvPr/>
+        </p:nvCxnSpPr>
+        <p:spPr>
+          <a:xfrm rot="16200000" flipH="1">
+            <a:off x="6509626" y="5852305"/>
+            <a:ext cx="208791" cy="300412"/>
+          </a:xfrm>
+          <a:prstGeom prst="bentConnector3">
+            <a:avLst>
+              <a:gd name="adj1" fmla="val 50000"/>
+            </a:avLst>
+          </a:prstGeom>
+        </p:spPr>
+        <p:style>
+          <a:lnRef idx="2">
+            <a:schemeClr val="accent1"/>
+          </a:lnRef>
+          <a:fillRef idx="0">
+            <a:schemeClr val="accent1"/>
+          </a:fillRef>
+          <a:effectRef idx="1">
+            <a:schemeClr val="accent1"/>
+          </a:effectRef>
+          <a:fontRef idx="minor">
+            <a:schemeClr val="tx1"/>
+          </a:fontRef>
+        </p:style>
+      </p:cxnSp>
+      <p:sp>
+        <p:nvSpPr>
+          <p:cNvPr id="25" name="TextBox 24">
+            <a:extLst>
+              <a:ext uri="{FF2B5EF4-FFF2-40B4-BE49-F238E27FC236}">
+                <a16:creationId xmlns:a16="http://schemas.microsoft.com/office/drawing/2014/main" xmlns="" id="{221BA4DF-20BA-48FE-A58A-6AEDA18B6DC3}"/>
+              </a:ext>
+            </a:extLst>
+          </p:cNvPr>
+          <p:cNvSpPr txBox="1"/>
+          <p:nvPr/>
+        </p:nvSpPr>
+        <p:spPr>
+          <a:xfrm>
+            <a:off x="2534826" y="3702325"/>
+            <a:ext cx="4030238" cy="369332"/>
+          </a:xfrm>
+          <a:prstGeom prst="rect">
+            <a:avLst/>
+          </a:prstGeom>
+          <a:noFill/>
+        </p:spPr>
+        <p:txBody>
+          <a:bodyPr wrap="square" rtlCol="0">
+            <a:spAutoFit/>
+          </a:bodyPr>
+          <a:lstStyle/>
+          <a:p>
+            <a:pPr algn="ctr"/>
+            <a:r>
+              <a:rPr lang="en-US" dirty="0" err="1" smtClean="0">
+                <a:latin typeface="Courier New"/>
+                <a:cs typeface="Courier New"/>
+              </a:rPr>
+              <a:t>lucian_from_kanika.csv</a:t>
+            </a:r>
+            <a:endParaRPr lang="en-US" dirty="0">
+              <a:latin typeface="Courier New"/>
+              <a:cs typeface="Courier New"/>
+            </a:endParaRPr>
+          </a:p>
+        </p:txBody>
+      </p:sp>
+      <p:cxnSp>
+        <p:nvCxnSpPr>
+          <p:cNvPr id="26" name="Elbow Connector 30">
+            <a:extLst>
+              <a:ext uri="{FF2B5EF4-FFF2-40B4-BE49-F238E27FC236}">
+                <a16:creationId xmlns:a16="http://schemas.microsoft.com/office/drawing/2014/main" xmlns="" id="{28744C4D-767A-49FE-8841-CF64DE7CF290}"/>
+              </a:ext>
+            </a:extLst>
+          </p:cNvPr>
+          <p:cNvCxnSpPr>
+            <a:cxnSpLocks/>
+            <a:stCxn id="25" idx="2"/>
+            <a:endCxn id="18" idx="0"/>
+          </p:cNvCxnSpPr>
+          <p:nvPr/>
+        </p:nvCxnSpPr>
+        <p:spPr>
+          <a:xfrm rot="16200000" flipH="1">
+            <a:off x="4445550" y="4176051"/>
+            <a:ext cx="208791" cy="1"/>
+          </a:xfrm>
+          <a:prstGeom prst="bentConnector3">
+            <a:avLst>
+              <a:gd name="adj1" fmla="val 50000"/>
+            </a:avLst>
+          </a:prstGeom>
+        </p:spPr>
+        <p:style>
+          <a:lnRef idx="2">
+            <a:schemeClr val="accent1"/>
+          </a:lnRef>
+          <a:fillRef idx="0">
+            <a:schemeClr val="accent1"/>
+          </a:fillRef>
+          <a:effectRef idx="1">
+            <a:schemeClr val="accent1"/>
+          </a:effectRef>
+          <a:fontRef idx="minor">
+            <a:schemeClr val="tx1"/>
+          </a:fontRef>
+        </p:style>
+      </p:cxnSp>
+      <p:sp>
+        <p:nvSpPr>
+          <p:cNvPr id="27" name="TextBox 26">
+            <a:extLst>
+              <a:ext uri="{FF2B5EF4-FFF2-40B4-BE49-F238E27FC236}">
+                <a16:creationId xmlns:a16="http://schemas.microsoft.com/office/drawing/2014/main" xmlns="" id="{E8BD1F53-AEB1-424F-8911-A488E9589575}"/>
+              </a:ext>
+            </a:extLst>
+          </p:cNvPr>
+          <p:cNvSpPr txBox="1"/>
+          <p:nvPr/>
+        </p:nvSpPr>
+        <p:spPr>
+          <a:xfrm>
+            <a:off x="3523236" y="5000781"/>
+            <a:ext cx="1901019" cy="338554"/>
+          </a:xfrm>
+          <a:prstGeom prst="rect">
+            <a:avLst/>
+          </a:prstGeom>
+          <a:noFill/>
+        </p:spPr>
+        <p:txBody>
+          <a:bodyPr wrap="square" rtlCol="0">
+            <a:spAutoFit/>
+          </a:bodyPr>
+          <a:lstStyle/>
+          <a:p>
+            <a:pPr algn="ctr"/>
+            <a:r>
+              <a:rPr lang="en-US" sz="1600" dirty="0" err="1" smtClean="0"/>
+              <a:t>VAFclusters_kanika</a:t>
+            </a:r>
+            <a:r>
+              <a:rPr lang="en-US" sz="1600" dirty="0" smtClean="0"/>
+              <a:t>/</a:t>
+            </a:r>
+            <a:endParaRPr lang="en-US" sz="1600" dirty="0"/>
+          </a:p>
+        </p:txBody>
+      </p:sp>
+      <p:cxnSp>
+        <p:nvCxnSpPr>
+          <p:cNvPr id="28" name="Elbow Connector 41">
+            <a:extLst>
+              <a:ext uri="{FF2B5EF4-FFF2-40B4-BE49-F238E27FC236}">
+                <a16:creationId xmlns:a16="http://schemas.microsoft.com/office/drawing/2014/main" xmlns="" id="{0E03B66C-B43C-4E63-8E6F-A2CD5B1957ED}"/>
+              </a:ext>
+            </a:extLst>
+          </p:cNvPr>
+          <p:cNvCxnSpPr>
+            <a:cxnSpLocks/>
+            <a:stCxn id="27" idx="2"/>
+            <a:endCxn id="23" idx="0"/>
+          </p:cNvCxnSpPr>
+          <p:nvPr/>
+        </p:nvCxnSpPr>
+        <p:spPr>
+          <a:xfrm rot="16200000" flipH="1">
+            <a:off x="5423824" y="4389256"/>
+            <a:ext cx="89913" cy="1990069"/>
+          </a:xfrm>
+          <a:prstGeom prst="bentConnector3">
+            <a:avLst>
+              <a:gd name="adj1" fmla="val 50000"/>
+            </a:avLst>
+          </a:prstGeom>
+        </p:spPr>
+        <p:style>
+          <a:lnRef idx="2">
+            <a:schemeClr val="accent1"/>
+          </a:lnRef>
+          <a:fillRef idx="0">
+            <a:schemeClr val="accent1"/>
+          </a:fillRef>
+          <a:effectRef idx="1">
+            <a:schemeClr val="accent1"/>
+          </a:effectRef>
+          <a:fontRef idx="minor">
+            <a:schemeClr val="tx1"/>
+          </a:fontRef>
+        </p:style>
+      </p:cxnSp>
+      <p:sp>
+        <p:nvSpPr>
+          <p:cNvPr id="29" name="TextBox 28">
+            <a:extLst>
+              <a:ext uri="{FF2B5EF4-FFF2-40B4-BE49-F238E27FC236}">
+                <a16:creationId xmlns:a16="http://schemas.microsoft.com/office/drawing/2014/main" xmlns="" id="{3A2EBB58-A883-45A4-93CA-D35E4C2CA86D}"/>
+              </a:ext>
+            </a:extLst>
+          </p:cNvPr>
+          <p:cNvSpPr txBox="1"/>
+          <p:nvPr/>
+        </p:nvSpPr>
+        <p:spPr>
+          <a:xfrm>
+            <a:off x="916553" y="6086314"/>
+            <a:ext cx="1818037" cy="338554"/>
+          </a:xfrm>
+          <a:prstGeom prst="rect">
+            <a:avLst/>
+          </a:prstGeom>
+          <a:noFill/>
+        </p:spPr>
+        <p:txBody>
+          <a:bodyPr wrap="square" rtlCol="0">
+            <a:spAutoFit/>
+          </a:bodyPr>
+          <a:lstStyle/>
+          <a:p>
+            <a:pPr algn="ctr"/>
+            <a:r>
+              <a:rPr lang="en-US" sz="1600" dirty="0" err="1"/>
+              <a:t>SNP_groups</a:t>
+            </a:r>
+            <a:r>
+              <a:rPr lang="en-US" sz="1600" dirty="0"/>
+              <a:t>/</a:t>
+            </a:r>
+          </a:p>
+        </p:txBody>
+      </p:sp>
+      <p:sp>
+        <p:nvSpPr>
+          <p:cNvPr id="30" name="Oval 29">
+            <a:extLst>
+              <a:ext uri="{FF2B5EF4-FFF2-40B4-BE49-F238E27FC236}">
+                <a16:creationId xmlns:a16="http://schemas.microsoft.com/office/drawing/2014/main" xmlns="" id="{8707D029-2347-40D7-AB1B-5C05AA7618F5}"/>
+              </a:ext>
+            </a:extLst>
+          </p:cNvPr>
+          <p:cNvSpPr/>
+          <p:nvPr/>
+        </p:nvSpPr>
+        <p:spPr>
+          <a:xfrm>
+            <a:off x="399567" y="5429248"/>
+            <a:ext cx="3478829" cy="468868"/>
+          </a:xfrm>
+          <a:prstGeom prst="ellipse">
+            <a:avLst/>
+          </a:prstGeom>
+        </p:spPr>
+        <p:style>
+          <a:lnRef idx="1">
+            <a:schemeClr val="accent1"/>
+          </a:lnRef>
+          <a:fillRef idx="3">
+            <a:schemeClr val="accent1"/>
+          </a:fillRef>
+          <a:effectRef idx="2">
+            <a:schemeClr val="accent1"/>
+          </a:effectRef>
+          <a:fontRef idx="minor">
+            <a:schemeClr val="lt1"/>
+          </a:fontRef>
+        </p:style>
+        <p:txBody>
+          <a:bodyPr rtlCol="0" anchor="ctr"/>
+          <a:lstStyle/>
+          <a:p>
+            <a:pPr algn="ctr"/>
+            <a:r>
+              <a:rPr lang="en-US" sz="1400" dirty="0" err="1"/>
+              <a:t>f</a:t>
+            </a:r>
+            <a:r>
+              <a:rPr lang="en-US" sz="1400" dirty="0" err="1" smtClean="0"/>
+              <a:t>ind_SNP_groups.py</a:t>
+            </a:r>
+            <a:endParaRPr lang="en-US" sz="1400" dirty="0"/>
+          </a:p>
+        </p:txBody>
+      </p:sp>
+      <p:cxnSp>
+        <p:nvCxnSpPr>
+          <p:cNvPr id="31" name="Elbow Connector 18">
+            <a:extLst>
+              <a:ext uri="{FF2B5EF4-FFF2-40B4-BE49-F238E27FC236}">
+                <a16:creationId xmlns:a16="http://schemas.microsoft.com/office/drawing/2014/main" xmlns="" id="{605BDC00-E715-4E06-A284-20EC83D5032F}"/>
+              </a:ext>
+            </a:extLst>
+          </p:cNvPr>
+          <p:cNvCxnSpPr>
+            <a:cxnSpLocks/>
+            <a:stCxn id="30" idx="4"/>
+            <a:endCxn id="29" idx="0"/>
+          </p:cNvCxnSpPr>
+          <p:nvPr/>
+        </p:nvCxnSpPr>
+        <p:spPr>
+          <a:xfrm rot="5400000">
+            <a:off x="1888178" y="5835510"/>
+            <a:ext cx="188198" cy="313410"/>
+          </a:xfrm>
+          <a:prstGeom prst="bentConnector3">
+            <a:avLst>
+              <a:gd name="adj1" fmla="val 50000"/>
+            </a:avLst>
+          </a:prstGeom>
+        </p:spPr>
+        <p:style>
+          <a:lnRef idx="2">
+            <a:schemeClr val="accent1"/>
+          </a:lnRef>
+          <a:fillRef idx="0">
+            <a:schemeClr val="accent1"/>
+          </a:fillRef>
+          <a:effectRef idx="1">
+            <a:schemeClr val="accent1"/>
+          </a:effectRef>
+          <a:fontRef idx="minor">
+            <a:schemeClr val="tx1"/>
+          </a:fontRef>
+        </p:style>
+      </p:cxnSp>
+      <p:cxnSp>
+        <p:nvCxnSpPr>
+          <p:cNvPr id="32" name="Elbow Connector 41">
+            <a:extLst>
+              <a:ext uri="{FF2B5EF4-FFF2-40B4-BE49-F238E27FC236}">
+                <a16:creationId xmlns:a16="http://schemas.microsoft.com/office/drawing/2014/main" xmlns="" id="{019AD323-762E-419B-865F-D562CA045EAA}"/>
+              </a:ext>
+            </a:extLst>
+          </p:cNvPr>
+          <p:cNvCxnSpPr>
+            <a:cxnSpLocks/>
+            <a:stCxn id="27" idx="2"/>
+            <a:endCxn id="30" idx="0"/>
+          </p:cNvCxnSpPr>
+          <p:nvPr/>
+        </p:nvCxnSpPr>
+        <p:spPr>
+          <a:xfrm rot="5400000">
+            <a:off x="3261408" y="4216909"/>
+            <a:ext cx="89913" cy="2334764"/>
           </a:xfrm>
           <a:prstGeom prst="bentConnector3">
             <a:avLst>

</xml_diff>